<commit_message>
se actualizo la informacion
</commit_message>
<xml_diff>
--- a/2015-2016/clases/computacion_aplicada_2/clase_8/clase_8.pptx
+++ b/2015-2016/clases/computacion_aplicada_2/clase_8/clase_8.pptx
@@ -1,26 +1,121 @@
 
 <file path=ppt/presentation.xml><?xml version="1.0" encoding="utf-8"?>
-<p:presentation xmlns:a="http://schemas.openxmlformats.org/drawingml/2006/main" xmlns:p="http://schemas.openxmlformats.org/presentationml/2006/main" xmlns:r="http://schemas.openxmlformats.org/officeDocument/2006/relationships">
+<p:presentation xmlns:a="http://schemas.openxmlformats.org/drawingml/2006/main" xmlns:r="http://schemas.openxmlformats.org/officeDocument/2006/relationships" xmlns:p="http://schemas.openxmlformats.org/presentationml/2006/main">
   <p:sldMasterIdLst>
-    <p:sldMasterId id="2147483648" r:id="rId2"/>
-    <p:sldMasterId id="2147483661" r:id="rId3"/>
-    <p:sldMasterId id="2147483674" r:id="rId4"/>
+    <p:sldMasterId id="2147483648" r:id="rId1"/>
+    <p:sldMasterId id="2147483661" r:id="rId2"/>
+    <p:sldMasterId id="2147483674" r:id="rId3"/>
   </p:sldMasterIdLst>
   <p:sldIdLst>
-    <p:sldId id="256" r:id="rId5"/>
-    <p:sldId id="257" r:id="rId6"/>
-    <p:sldId id="258" r:id="rId7"/>
-    <p:sldId id="259" r:id="rId8"/>
-    <p:sldId id="260" r:id="rId9"/>
-    <p:sldId id="261" r:id="rId10"/>
+    <p:sldId id="256" r:id="rId4"/>
+    <p:sldId id="257" r:id="rId5"/>
+    <p:sldId id="258" r:id="rId6"/>
+    <p:sldId id="259" r:id="rId7"/>
+    <p:sldId id="260" r:id="rId8"/>
+    <p:sldId id="261" r:id="rId9"/>
   </p:sldIdLst>
-  <p:sldSz cx="9144000" cy="6858000"/>
-  <p:notesSz cx="7559675" cy="10691812"/>
+  <p:sldSz cx="9144000" cy="6858000" type="screen4x3"/>
+  <p:notesSz cx="7559675" cy="10691813"/>
+  <p:defaultTextStyle>
+    <a:defPPr>
+      <a:defRPr lang="es-ES"/>
+    </a:defPPr>
+    <a:lvl1pPr marL="0" algn="l" defTabSz="914400" rtl="0" eaLnBrk="1" latinLnBrk="0" hangingPunct="1">
+      <a:defRPr sz="1800" kern="1200">
+        <a:solidFill>
+          <a:schemeClr val="tx1"/>
+        </a:solidFill>
+        <a:latin typeface="+mn-lt"/>
+        <a:ea typeface="+mn-ea"/>
+        <a:cs typeface="+mn-cs"/>
+      </a:defRPr>
+    </a:lvl1pPr>
+    <a:lvl2pPr marL="457200" algn="l" defTabSz="914400" rtl="0" eaLnBrk="1" latinLnBrk="0" hangingPunct="1">
+      <a:defRPr sz="1800" kern="1200">
+        <a:solidFill>
+          <a:schemeClr val="tx1"/>
+        </a:solidFill>
+        <a:latin typeface="+mn-lt"/>
+        <a:ea typeface="+mn-ea"/>
+        <a:cs typeface="+mn-cs"/>
+      </a:defRPr>
+    </a:lvl2pPr>
+    <a:lvl3pPr marL="914400" algn="l" defTabSz="914400" rtl="0" eaLnBrk="1" latinLnBrk="0" hangingPunct="1">
+      <a:defRPr sz="1800" kern="1200">
+        <a:solidFill>
+          <a:schemeClr val="tx1"/>
+        </a:solidFill>
+        <a:latin typeface="+mn-lt"/>
+        <a:ea typeface="+mn-ea"/>
+        <a:cs typeface="+mn-cs"/>
+      </a:defRPr>
+    </a:lvl3pPr>
+    <a:lvl4pPr marL="1371600" algn="l" defTabSz="914400" rtl="0" eaLnBrk="1" latinLnBrk="0" hangingPunct="1">
+      <a:defRPr sz="1800" kern="1200">
+        <a:solidFill>
+          <a:schemeClr val="tx1"/>
+        </a:solidFill>
+        <a:latin typeface="+mn-lt"/>
+        <a:ea typeface="+mn-ea"/>
+        <a:cs typeface="+mn-cs"/>
+      </a:defRPr>
+    </a:lvl4pPr>
+    <a:lvl5pPr marL="1828800" algn="l" defTabSz="914400" rtl="0" eaLnBrk="1" latinLnBrk="0" hangingPunct="1">
+      <a:defRPr sz="1800" kern="1200">
+        <a:solidFill>
+          <a:schemeClr val="tx1"/>
+        </a:solidFill>
+        <a:latin typeface="+mn-lt"/>
+        <a:ea typeface="+mn-ea"/>
+        <a:cs typeface="+mn-cs"/>
+      </a:defRPr>
+    </a:lvl5pPr>
+    <a:lvl6pPr marL="2286000" algn="l" defTabSz="914400" rtl="0" eaLnBrk="1" latinLnBrk="0" hangingPunct="1">
+      <a:defRPr sz="1800" kern="1200">
+        <a:solidFill>
+          <a:schemeClr val="tx1"/>
+        </a:solidFill>
+        <a:latin typeface="+mn-lt"/>
+        <a:ea typeface="+mn-ea"/>
+        <a:cs typeface="+mn-cs"/>
+      </a:defRPr>
+    </a:lvl6pPr>
+    <a:lvl7pPr marL="2743200" algn="l" defTabSz="914400" rtl="0" eaLnBrk="1" latinLnBrk="0" hangingPunct="1">
+      <a:defRPr sz="1800" kern="1200">
+        <a:solidFill>
+          <a:schemeClr val="tx1"/>
+        </a:solidFill>
+        <a:latin typeface="+mn-lt"/>
+        <a:ea typeface="+mn-ea"/>
+        <a:cs typeface="+mn-cs"/>
+      </a:defRPr>
+    </a:lvl7pPr>
+    <a:lvl8pPr marL="3200400" algn="l" defTabSz="914400" rtl="0" eaLnBrk="1" latinLnBrk="0" hangingPunct="1">
+      <a:defRPr sz="1800" kern="1200">
+        <a:solidFill>
+          <a:schemeClr val="tx1"/>
+        </a:solidFill>
+        <a:latin typeface="+mn-lt"/>
+        <a:ea typeface="+mn-ea"/>
+        <a:cs typeface="+mn-cs"/>
+      </a:defRPr>
+    </a:lvl8pPr>
+    <a:lvl9pPr marL="3657600" algn="l" defTabSz="914400" rtl="0" eaLnBrk="1" latinLnBrk="0" hangingPunct="1">
+      <a:defRPr sz="1800" kern="1200">
+        <a:solidFill>
+          <a:schemeClr val="tx1"/>
+        </a:solidFill>
+        <a:latin typeface="+mn-lt"/>
+        <a:ea typeface="+mn-ea"/>
+        <a:cs typeface="+mn-cs"/>
+      </a:defRPr>
+    </a:lvl9pPr>
+  </p:defaultTextStyle>
 </p:presentation>
 </file>
 
 <file path=ppt/slideLayouts/slideLayout1.xml><?xml version="1.0" encoding="utf-8"?>
-<p:sldLayout xmlns:a="http://schemas.openxmlformats.org/drawingml/2006/main" xmlns:p="http://schemas.openxmlformats.org/presentationml/2006/main" xmlns:r="http://schemas.openxmlformats.org/officeDocument/2006/relationships" type="blank" preserve="1">
+<p:sldLayout xmlns:a="http://schemas.openxmlformats.org/drawingml/2006/main" xmlns:r="http://schemas.openxmlformats.org/officeDocument/2006/relationships" xmlns:p="http://schemas.openxmlformats.org/presentationml/2006/main" type="blank" preserve="1">
   <p:cSld name="Blank Slide">
     <p:spTree>
       <p:nvGrpSpPr>
@@ -38,11 +133,14 @@
       </p:grpSpPr>
     </p:spTree>
   </p:cSld>
+  <p:clrMapOvr>
+    <a:masterClrMapping/>
+  </p:clrMapOvr>
 </p:sldLayout>
 </file>
 
 <file path=ppt/slideLayouts/slideLayout10.xml><?xml version="1.0" encoding="utf-8"?>
-<p:sldLayout xmlns:a="http://schemas.openxmlformats.org/drawingml/2006/main" xmlns:p="http://schemas.openxmlformats.org/presentationml/2006/main" xmlns:r="http://schemas.openxmlformats.org/officeDocument/2006/relationships" type="objOverTx" preserve="1">
+<p:sldLayout xmlns:a="http://schemas.openxmlformats.org/drawingml/2006/main" xmlns:r="http://schemas.openxmlformats.org/officeDocument/2006/relationships" xmlns:p="http://schemas.openxmlformats.org/presentationml/2006/main" type="objOverTx" preserve="1">
   <p:cSld name="Title, Content over Content">
     <p:spTree>
       <p:nvGrpSpPr>
@@ -78,7 +176,8 @@
           </a:prstGeom>
         </p:spPr>
         <p:txBody>
-          <a:bodyPr lIns="0" rIns="0" tIns="0" bIns="0" anchor="ctr"/>
+          <a:bodyPr lIns="0" tIns="0" rIns="0" bIns="0" anchor="ctr"/>
+          <a:lstStyle/>
           <a:p>
             <a:pPr algn="ctr"/>
             <a:endParaRPr/>
@@ -105,7 +204,8 @@
           </a:prstGeom>
         </p:spPr>
         <p:txBody>
-          <a:bodyPr lIns="0" rIns="0" tIns="0" bIns="0"/>
+          <a:bodyPr lIns="0" tIns="0" rIns="0" bIns="0"/>
+          <a:lstStyle/>
           <a:p>
             <a:endParaRPr/>
           </a:p>
@@ -131,7 +231,8 @@
           </a:prstGeom>
         </p:spPr>
         <p:txBody>
-          <a:bodyPr lIns="0" rIns="0" tIns="0" bIns="0"/>
+          <a:bodyPr lIns="0" tIns="0" rIns="0" bIns="0"/>
+          <a:lstStyle/>
           <a:p>
             <a:endParaRPr/>
           </a:p>
@@ -139,11 +240,14 @@
       </p:sp>
     </p:spTree>
   </p:cSld>
+  <p:clrMapOvr>
+    <a:masterClrMapping/>
+  </p:clrMapOvr>
 </p:sldLayout>
 </file>
 
 <file path=ppt/slideLayouts/slideLayout11.xml><?xml version="1.0" encoding="utf-8"?>
-<p:sldLayout xmlns:a="http://schemas.openxmlformats.org/drawingml/2006/main" xmlns:p="http://schemas.openxmlformats.org/presentationml/2006/main" xmlns:r="http://schemas.openxmlformats.org/officeDocument/2006/relationships" type="fourObj" preserve="1">
+<p:sldLayout xmlns:a="http://schemas.openxmlformats.org/drawingml/2006/main" xmlns:r="http://schemas.openxmlformats.org/officeDocument/2006/relationships" xmlns:p="http://schemas.openxmlformats.org/presentationml/2006/main" type="fourObj" preserve="1">
   <p:cSld name="Title, 4 Content">
     <p:spTree>
       <p:nvGrpSpPr>
@@ -179,7 +283,8 @@
           </a:prstGeom>
         </p:spPr>
         <p:txBody>
-          <a:bodyPr lIns="0" rIns="0" tIns="0" bIns="0" anchor="ctr"/>
+          <a:bodyPr lIns="0" tIns="0" rIns="0" bIns="0" anchor="ctr"/>
+          <a:lstStyle/>
           <a:p>
             <a:pPr algn="ctr"/>
             <a:endParaRPr/>
@@ -206,7 +311,8 @@
           </a:prstGeom>
         </p:spPr>
         <p:txBody>
-          <a:bodyPr lIns="0" rIns="0" tIns="0" bIns="0"/>
+          <a:bodyPr lIns="0" tIns="0" rIns="0" bIns="0"/>
+          <a:lstStyle/>
           <a:p>
             <a:endParaRPr/>
           </a:p>
@@ -232,7 +338,8 @@
           </a:prstGeom>
         </p:spPr>
         <p:txBody>
-          <a:bodyPr lIns="0" rIns="0" tIns="0" bIns="0"/>
+          <a:bodyPr lIns="0" tIns="0" rIns="0" bIns="0"/>
+          <a:lstStyle/>
           <a:p>
             <a:endParaRPr/>
           </a:p>
@@ -258,7 +365,8 @@
           </a:prstGeom>
         </p:spPr>
         <p:txBody>
-          <a:bodyPr lIns="0" rIns="0" tIns="0" bIns="0"/>
+          <a:bodyPr lIns="0" tIns="0" rIns="0" bIns="0"/>
+          <a:lstStyle/>
           <a:p>
             <a:endParaRPr/>
           </a:p>
@@ -284,7 +392,8 @@
           </a:prstGeom>
         </p:spPr>
         <p:txBody>
-          <a:bodyPr lIns="0" rIns="0" tIns="0" bIns="0"/>
+          <a:bodyPr lIns="0" tIns="0" rIns="0" bIns="0"/>
+          <a:lstStyle/>
           <a:p>
             <a:endParaRPr/>
           </a:p>
@@ -292,11 +401,14 @@
       </p:sp>
     </p:spTree>
   </p:cSld>
+  <p:clrMapOvr>
+    <a:masterClrMapping/>
+  </p:clrMapOvr>
 </p:sldLayout>
 </file>
 
 <file path=ppt/slideLayouts/slideLayout12.xml><?xml version="1.0" encoding="utf-8"?>
-<p:sldLayout xmlns:a="http://schemas.openxmlformats.org/drawingml/2006/main" xmlns:p="http://schemas.openxmlformats.org/presentationml/2006/main" xmlns:r="http://schemas.openxmlformats.org/officeDocument/2006/relationships" type="blank" preserve="1">
+<p:sldLayout xmlns:a="http://schemas.openxmlformats.org/drawingml/2006/main" xmlns:r="http://schemas.openxmlformats.org/officeDocument/2006/relationships" xmlns:p="http://schemas.openxmlformats.org/presentationml/2006/main" type="blank" preserve="1">
   <p:cSld name="Title, 6 Content">
     <p:spTree>
       <p:nvGrpSpPr>
@@ -332,7 +444,8 @@
           </a:prstGeom>
         </p:spPr>
         <p:txBody>
-          <a:bodyPr lIns="0" rIns="0" tIns="0" bIns="0" anchor="ctr"/>
+          <a:bodyPr lIns="0" tIns="0" rIns="0" bIns="0" anchor="ctr"/>
+          <a:lstStyle/>
           <a:p>
             <a:pPr algn="ctr"/>
             <a:endParaRPr/>
@@ -359,7 +472,8 @@
           </a:prstGeom>
         </p:spPr>
         <p:txBody>
-          <a:bodyPr lIns="0" rIns="0" tIns="0" bIns="0"/>
+          <a:bodyPr lIns="0" tIns="0" rIns="0" bIns="0"/>
+          <a:lstStyle/>
           <a:p>
             <a:endParaRPr/>
           </a:p>
@@ -385,7 +499,8 @@
           </a:prstGeom>
         </p:spPr>
         <p:txBody>
-          <a:bodyPr lIns="0" rIns="0" tIns="0" bIns="0"/>
+          <a:bodyPr lIns="0" tIns="0" rIns="0" bIns="0"/>
+          <a:lstStyle/>
           <a:p>
             <a:endParaRPr/>
           </a:p>
@@ -393,7 +508,7 @@
       </p:sp>
       <p:pic>
         <p:nvPicPr>
-          <p:cNvPr id="42" name="" descr=""/>
+          <p:cNvPr id="42" name="41 Imagen"/>
           <p:cNvPicPr/>
           <p:nvPr/>
         </p:nvPicPr>
@@ -418,12 +533,12 @@
       </p:pic>
       <p:pic>
         <p:nvPicPr>
-          <p:cNvPr id="43" name="" descr=""/>
+          <p:cNvPr id="43" name="42 Imagen"/>
           <p:cNvPicPr/>
           <p:nvPr/>
         </p:nvPicPr>
         <p:blipFill>
-          <a:blip r:embed="rId3"/>
+          <a:blip r:embed="rId2"/>
           <a:stretch>
             <a:fillRect/>
           </a:stretch>
@@ -443,11 +558,14 @@
       </p:pic>
     </p:spTree>
   </p:cSld>
+  <p:clrMapOvr>
+    <a:masterClrMapping/>
+  </p:clrMapOvr>
 </p:sldLayout>
 </file>
 
 <file path=ppt/slideLayouts/slideLayout13.xml><?xml version="1.0" encoding="utf-8"?>
-<p:sldLayout xmlns:a="http://schemas.openxmlformats.org/drawingml/2006/main" xmlns:p="http://schemas.openxmlformats.org/presentationml/2006/main" xmlns:r="http://schemas.openxmlformats.org/officeDocument/2006/relationships" type="blank" preserve="1">
+<p:sldLayout xmlns:a="http://schemas.openxmlformats.org/drawingml/2006/main" xmlns:r="http://schemas.openxmlformats.org/officeDocument/2006/relationships" xmlns:p="http://schemas.openxmlformats.org/presentationml/2006/main" type="blank" preserve="1">
   <p:cSld name="Blank Slide">
     <p:spTree>
       <p:nvGrpSpPr>
@@ -465,11 +583,14 @@
       </p:grpSpPr>
     </p:spTree>
   </p:cSld>
+  <p:clrMapOvr>
+    <a:masterClrMapping/>
+  </p:clrMapOvr>
 </p:sldLayout>
 </file>
 
 <file path=ppt/slideLayouts/slideLayout14.xml><?xml version="1.0" encoding="utf-8"?>
-<p:sldLayout xmlns:a="http://schemas.openxmlformats.org/drawingml/2006/main" xmlns:p="http://schemas.openxmlformats.org/presentationml/2006/main" xmlns:r="http://schemas.openxmlformats.org/officeDocument/2006/relationships" type="tx" preserve="1">
+<p:sldLayout xmlns:a="http://schemas.openxmlformats.org/drawingml/2006/main" xmlns:r="http://schemas.openxmlformats.org/officeDocument/2006/relationships" xmlns:p="http://schemas.openxmlformats.org/presentationml/2006/main" type="tx" preserve="1">
   <p:cSld name="Title Slide">
     <p:spTree>
       <p:nvGrpSpPr>
@@ -505,7 +626,8 @@
           </a:prstGeom>
         </p:spPr>
         <p:txBody>
-          <a:bodyPr lIns="0" rIns="0" tIns="0" bIns="0" anchor="ctr"/>
+          <a:bodyPr lIns="0" tIns="0" rIns="0" bIns="0" anchor="ctr"/>
+          <a:lstStyle/>
           <a:p>
             <a:pPr algn="ctr"/>
             <a:endParaRPr/>
@@ -532,7 +654,8 @@
           </a:prstGeom>
         </p:spPr>
         <p:txBody>
-          <a:bodyPr lIns="0" rIns="0" tIns="0" bIns="0" anchor="ctr"/>
+          <a:bodyPr lIns="0" tIns="0" rIns="0" bIns="0" anchor="ctr"/>
+          <a:lstStyle/>
           <a:p>
             <a:pPr algn="ctr"/>
             <a:endParaRPr/>
@@ -541,11 +664,14 @@
       </p:sp>
     </p:spTree>
   </p:cSld>
+  <p:clrMapOvr>
+    <a:masterClrMapping/>
+  </p:clrMapOvr>
 </p:sldLayout>
 </file>
 
 <file path=ppt/slideLayouts/slideLayout15.xml><?xml version="1.0" encoding="utf-8"?>
-<p:sldLayout xmlns:a="http://schemas.openxmlformats.org/drawingml/2006/main" xmlns:p="http://schemas.openxmlformats.org/presentationml/2006/main" xmlns:r="http://schemas.openxmlformats.org/officeDocument/2006/relationships" type="obj" preserve="1">
+<p:sldLayout xmlns:a="http://schemas.openxmlformats.org/drawingml/2006/main" xmlns:r="http://schemas.openxmlformats.org/officeDocument/2006/relationships" xmlns:p="http://schemas.openxmlformats.org/presentationml/2006/main" type="obj" preserve="1">
   <p:cSld name="Title, Content">
     <p:spTree>
       <p:nvGrpSpPr>
@@ -581,7 +707,8 @@
           </a:prstGeom>
         </p:spPr>
         <p:txBody>
-          <a:bodyPr lIns="0" rIns="0" tIns="0" bIns="0" anchor="ctr"/>
+          <a:bodyPr lIns="0" tIns="0" rIns="0" bIns="0" anchor="ctr"/>
+          <a:lstStyle/>
           <a:p>
             <a:pPr algn="ctr"/>
             <a:endParaRPr/>
@@ -608,7 +735,8 @@
           </a:prstGeom>
         </p:spPr>
         <p:txBody>
-          <a:bodyPr lIns="0" rIns="0" tIns="0" bIns="0"/>
+          <a:bodyPr lIns="0" tIns="0" rIns="0" bIns="0"/>
+          <a:lstStyle/>
           <a:p>
             <a:endParaRPr/>
           </a:p>
@@ -616,11 +744,14 @@
       </p:sp>
     </p:spTree>
   </p:cSld>
+  <p:clrMapOvr>
+    <a:masterClrMapping/>
+  </p:clrMapOvr>
 </p:sldLayout>
 </file>
 
 <file path=ppt/slideLayouts/slideLayout16.xml><?xml version="1.0" encoding="utf-8"?>
-<p:sldLayout xmlns:a="http://schemas.openxmlformats.org/drawingml/2006/main" xmlns:p="http://schemas.openxmlformats.org/presentationml/2006/main" xmlns:r="http://schemas.openxmlformats.org/officeDocument/2006/relationships" type="twoObj" preserve="1">
+<p:sldLayout xmlns:a="http://schemas.openxmlformats.org/drawingml/2006/main" xmlns:r="http://schemas.openxmlformats.org/officeDocument/2006/relationships" xmlns:p="http://schemas.openxmlformats.org/presentationml/2006/main" type="twoObj" preserve="1">
   <p:cSld name="Title, 2 Content">
     <p:spTree>
       <p:nvGrpSpPr>
@@ -656,7 +787,8 @@
           </a:prstGeom>
         </p:spPr>
         <p:txBody>
-          <a:bodyPr lIns="0" rIns="0" tIns="0" bIns="0" anchor="ctr"/>
+          <a:bodyPr lIns="0" tIns="0" rIns="0" bIns="0" anchor="ctr"/>
+          <a:lstStyle/>
           <a:p>
             <a:pPr algn="ctr"/>
             <a:endParaRPr/>
@@ -683,7 +815,8 @@
           </a:prstGeom>
         </p:spPr>
         <p:txBody>
-          <a:bodyPr lIns="0" rIns="0" tIns="0" bIns="0"/>
+          <a:bodyPr lIns="0" tIns="0" rIns="0" bIns="0"/>
+          <a:lstStyle/>
           <a:p>
             <a:endParaRPr/>
           </a:p>
@@ -709,7 +842,8 @@
           </a:prstGeom>
         </p:spPr>
         <p:txBody>
-          <a:bodyPr lIns="0" rIns="0" tIns="0" bIns="0"/>
+          <a:bodyPr lIns="0" tIns="0" rIns="0" bIns="0"/>
+          <a:lstStyle/>
           <a:p>
             <a:endParaRPr/>
           </a:p>
@@ -717,11 +851,14 @@
       </p:sp>
     </p:spTree>
   </p:cSld>
+  <p:clrMapOvr>
+    <a:masterClrMapping/>
+  </p:clrMapOvr>
 </p:sldLayout>
 </file>
 
 <file path=ppt/slideLayouts/slideLayout17.xml><?xml version="1.0" encoding="utf-8"?>
-<p:sldLayout xmlns:a="http://schemas.openxmlformats.org/drawingml/2006/main" xmlns:p="http://schemas.openxmlformats.org/presentationml/2006/main" xmlns:r="http://schemas.openxmlformats.org/officeDocument/2006/relationships" type="titleOnly" preserve="1">
+<p:sldLayout xmlns:a="http://schemas.openxmlformats.org/drawingml/2006/main" xmlns:r="http://schemas.openxmlformats.org/officeDocument/2006/relationships" xmlns:p="http://schemas.openxmlformats.org/presentationml/2006/main" type="titleOnly" preserve="1">
   <p:cSld name="Title Only">
     <p:spTree>
       <p:nvGrpSpPr>
@@ -757,7 +894,8 @@
           </a:prstGeom>
         </p:spPr>
         <p:txBody>
-          <a:bodyPr lIns="0" rIns="0" tIns="0" bIns="0" anchor="ctr"/>
+          <a:bodyPr lIns="0" tIns="0" rIns="0" bIns="0" anchor="ctr"/>
+          <a:lstStyle/>
           <a:p>
             <a:pPr algn="ctr"/>
             <a:endParaRPr/>
@@ -766,11 +904,14 @@
       </p:sp>
     </p:spTree>
   </p:cSld>
+  <p:clrMapOvr>
+    <a:masterClrMapping/>
+  </p:clrMapOvr>
 </p:sldLayout>
 </file>
 
 <file path=ppt/slideLayouts/slideLayout18.xml><?xml version="1.0" encoding="utf-8"?>
-<p:sldLayout xmlns:a="http://schemas.openxmlformats.org/drawingml/2006/main" xmlns:p="http://schemas.openxmlformats.org/presentationml/2006/main" xmlns:r="http://schemas.openxmlformats.org/officeDocument/2006/relationships" type="objOnly" preserve="1">
+<p:sldLayout xmlns:a="http://schemas.openxmlformats.org/drawingml/2006/main" xmlns:r="http://schemas.openxmlformats.org/officeDocument/2006/relationships" xmlns:p="http://schemas.openxmlformats.org/presentationml/2006/main" type="objOnly" preserve="1">
   <p:cSld name="Centered Text">
     <p:spTree>
       <p:nvGrpSpPr>
@@ -806,7 +947,8 @@
           </a:prstGeom>
         </p:spPr>
         <p:txBody>
-          <a:bodyPr lIns="0" rIns="0" tIns="0" bIns="0" anchor="ctr"/>
+          <a:bodyPr lIns="0" tIns="0" rIns="0" bIns="0" anchor="ctr"/>
+          <a:lstStyle/>
           <a:p>
             <a:pPr algn="ctr"/>
             <a:endParaRPr/>
@@ -815,11 +957,14 @@
       </p:sp>
     </p:spTree>
   </p:cSld>
+  <p:clrMapOvr>
+    <a:masterClrMapping/>
+  </p:clrMapOvr>
 </p:sldLayout>
 </file>
 
 <file path=ppt/slideLayouts/slideLayout19.xml><?xml version="1.0" encoding="utf-8"?>
-<p:sldLayout xmlns:a="http://schemas.openxmlformats.org/drawingml/2006/main" xmlns:p="http://schemas.openxmlformats.org/presentationml/2006/main" xmlns:r="http://schemas.openxmlformats.org/officeDocument/2006/relationships" type="twoObjAndObj" preserve="1">
+<p:sldLayout xmlns:a="http://schemas.openxmlformats.org/drawingml/2006/main" xmlns:r="http://schemas.openxmlformats.org/officeDocument/2006/relationships" xmlns:p="http://schemas.openxmlformats.org/presentationml/2006/main" type="twoObjAndObj" preserve="1">
   <p:cSld name="Title, 2 Content and Content">
     <p:spTree>
       <p:nvGrpSpPr>
@@ -855,7 +1000,8 @@
           </a:prstGeom>
         </p:spPr>
         <p:txBody>
-          <a:bodyPr lIns="0" rIns="0" tIns="0" bIns="0" anchor="ctr"/>
+          <a:bodyPr lIns="0" tIns="0" rIns="0" bIns="0" anchor="ctr"/>
+          <a:lstStyle/>
           <a:p>
             <a:pPr algn="ctr"/>
             <a:endParaRPr/>
@@ -882,7 +1028,8 @@
           </a:prstGeom>
         </p:spPr>
         <p:txBody>
-          <a:bodyPr lIns="0" rIns="0" tIns="0" bIns="0"/>
+          <a:bodyPr lIns="0" tIns="0" rIns="0" bIns="0"/>
+          <a:lstStyle/>
           <a:p>
             <a:endParaRPr/>
           </a:p>
@@ -908,7 +1055,8 @@
           </a:prstGeom>
         </p:spPr>
         <p:txBody>
-          <a:bodyPr lIns="0" rIns="0" tIns="0" bIns="0"/>
+          <a:bodyPr lIns="0" tIns="0" rIns="0" bIns="0"/>
+          <a:lstStyle/>
           <a:p>
             <a:endParaRPr/>
           </a:p>
@@ -934,7 +1082,8 @@
           </a:prstGeom>
         </p:spPr>
         <p:txBody>
-          <a:bodyPr lIns="0" rIns="0" tIns="0" bIns="0"/>
+          <a:bodyPr lIns="0" tIns="0" rIns="0" bIns="0"/>
+          <a:lstStyle/>
           <a:p>
             <a:endParaRPr/>
           </a:p>
@@ -942,11 +1091,14 @@
       </p:sp>
     </p:spTree>
   </p:cSld>
+  <p:clrMapOvr>
+    <a:masterClrMapping/>
+  </p:clrMapOvr>
 </p:sldLayout>
 </file>
 
 <file path=ppt/slideLayouts/slideLayout2.xml><?xml version="1.0" encoding="utf-8"?>
-<p:sldLayout xmlns:a="http://schemas.openxmlformats.org/drawingml/2006/main" xmlns:p="http://schemas.openxmlformats.org/presentationml/2006/main" xmlns:r="http://schemas.openxmlformats.org/officeDocument/2006/relationships" type="tx" preserve="1">
+<p:sldLayout xmlns:a="http://schemas.openxmlformats.org/drawingml/2006/main" xmlns:r="http://schemas.openxmlformats.org/officeDocument/2006/relationships" xmlns:p="http://schemas.openxmlformats.org/presentationml/2006/main" type="tx" preserve="1">
   <p:cSld name="Title Slide">
     <p:spTree>
       <p:nvGrpSpPr>
@@ -982,7 +1134,8 @@
           </a:prstGeom>
         </p:spPr>
         <p:txBody>
-          <a:bodyPr lIns="0" rIns="0" tIns="0" bIns="0" anchor="ctr"/>
+          <a:bodyPr lIns="0" tIns="0" rIns="0" bIns="0" anchor="ctr"/>
+          <a:lstStyle/>
           <a:p>
             <a:pPr algn="ctr"/>
             <a:endParaRPr/>
@@ -1009,7 +1162,8 @@
           </a:prstGeom>
         </p:spPr>
         <p:txBody>
-          <a:bodyPr lIns="0" rIns="0" tIns="0" bIns="0" anchor="ctr"/>
+          <a:bodyPr lIns="0" tIns="0" rIns="0" bIns="0" anchor="ctr"/>
+          <a:lstStyle/>
           <a:p>
             <a:pPr algn="ctr"/>
             <a:endParaRPr/>
@@ -1018,11 +1172,14 @@
       </p:sp>
     </p:spTree>
   </p:cSld>
+  <p:clrMapOvr>
+    <a:masterClrMapping/>
+  </p:clrMapOvr>
 </p:sldLayout>
 </file>
 
 <file path=ppt/slideLayouts/slideLayout20.xml><?xml version="1.0" encoding="utf-8"?>
-<p:sldLayout xmlns:a="http://schemas.openxmlformats.org/drawingml/2006/main" xmlns:p="http://schemas.openxmlformats.org/presentationml/2006/main" xmlns:r="http://schemas.openxmlformats.org/officeDocument/2006/relationships" type="objAndTwoObj" preserve="1">
+<p:sldLayout xmlns:a="http://schemas.openxmlformats.org/drawingml/2006/main" xmlns:r="http://schemas.openxmlformats.org/officeDocument/2006/relationships" xmlns:p="http://schemas.openxmlformats.org/presentationml/2006/main" type="objAndTwoObj" preserve="1">
   <p:cSld name="Title Content and 2 Content">
     <p:spTree>
       <p:nvGrpSpPr>
@@ -1058,7 +1215,8 @@
           </a:prstGeom>
         </p:spPr>
         <p:txBody>
-          <a:bodyPr lIns="0" rIns="0" tIns="0" bIns="0" anchor="ctr"/>
+          <a:bodyPr lIns="0" tIns="0" rIns="0" bIns="0" anchor="ctr"/>
+          <a:lstStyle/>
           <a:p>
             <a:pPr algn="ctr"/>
             <a:endParaRPr/>
@@ -1085,7 +1243,8 @@
           </a:prstGeom>
         </p:spPr>
         <p:txBody>
-          <a:bodyPr lIns="0" rIns="0" tIns="0" bIns="0"/>
+          <a:bodyPr lIns="0" tIns="0" rIns="0" bIns="0"/>
+          <a:lstStyle/>
           <a:p>
             <a:endParaRPr/>
           </a:p>
@@ -1111,7 +1270,8 @@
           </a:prstGeom>
         </p:spPr>
         <p:txBody>
-          <a:bodyPr lIns="0" rIns="0" tIns="0" bIns="0"/>
+          <a:bodyPr lIns="0" tIns="0" rIns="0" bIns="0"/>
+          <a:lstStyle/>
           <a:p>
             <a:endParaRPr/>
           </a:p>
@@ -1137,7 +1297,8 @@
           </a:prstGeom>
         </p:spPr>
         <p:txBody>
-          <a:bodyPr lIns="0" rIns="0" tIns="0" bIns="0"/>
+          <a:bodyPr lIns="0" tIns="0" rIns="0" bIns="0"/>
+          <a:lstStyle/>
           <a:p>
             <a:endParaRPr/>
           </a:p>
@@ -1145,11 +1306,14 @@
       </p:sp>
     </p:spTree>
   </p:cSld>
+  <p:clrMapOvr>
+    <a:masterClrMapping/>
+  </p:clrMapOvr>
 </p:sldLayout>
 </file>
 
 <file path=ppt/slideLayouts/slideLayout21.xml><?xml version="1.0" encoding="utf-8"?>
-<p:sldLayout xmlns:a="http://schemas.openxmlformats.org/drawingml/2006/main" xmlns:p="http://schemas.openxmlformats.org/presentationml/2006/main" xmlns:r="http://schemas.openxmlformats.org/officeDocument/2006/relationships" type="twoObjOverTx" preserve="1">
+<p:sldLayout xmlns:a="http://schemas.openxmlformats.org/drawingml/2006/main" xmlns:r="http://schemas.openxmlformats.org/officeDocument/2006/relationships" xmlns:p="http://schemas.openxmlformats.org/presentationml/2006/main" type="twoObjOverTx" preserve="1">
   <p:cSld name="Title, 2 Content over Content">
     <p:spTree>
       <p:nvGrpSpPr>
@@ -1185,7 +1349,8 @@
           </a:prstGeom>
         </p:spPr>
         <p:txBody>
-          <a:bodyPr lIns="0" rIns="0" tIns="0" bIns="0" anchor="ctr"/>
+          <a:bodyPr lIns="0" tIns="0" rIns="0" bIns="0" anchor="ctr"/>
+          <a:lstStyle/>
           <a:p>
             <a:pPr algn="ctr"/>
             <a:endParaRPr/>
@@ -1212,7 +1377,8 @@
           </a:prstGeom>
         </p:spPr>
         <p:txBody>
-          <a:bodyPr lIns="0" rIns="0" tIns="0" bIns="0"/>
+          <a:bodyPr lIns="0" tIns="0" rIns="0" bIns="0"/>
+          <a:lstStyle/>
           <a:p>
             <a:endParaRPr/>
           </a:p>
@@ -1238,7 +1404,8 @@
           </a:prstGeom>
         </p:spPr>
         <p:txBody>
-          <a:bodyPr lIns="0" rIns="0" tIns="0" bIns="0"/>
+          <a:bodyPr lIns="0" tIns="0" rIns="0" bIns="0"/>
+          <a:lstStyle/>
           <a:p>
             <a:endParaRPr/>
           </a:p>
@@ -1264,7 +1431,8 @@
           </a:prstGeom>
         </p:spPr>
         <p:txBody>
-          <a:bodyPr lIns="0" rIns="0" tIns="0" bIns="0"/>
+          <a:bodyPr lIns="0" tIns="0" rIns="0" bIns="0"/>
+          <a:lstStyle/>
           <a:p>
             <a:endParaRPr/>
           </a:p>
@@ -1272,11 +1440,14 @@
       </p:sp>
     </p:spTree>
   </p:cSld>
+  <p:clrMapOvr>
+    <a:masterClrMapping/>
+  </p:clrMapOvr>
 </p:sldLayout>
 </file>
 
 <file path=ppt/slideLayouts/slideLayout22.xml><?xml version="1.0" encoding="utf-8"?>
-<p:sldLayout xmlns:a="http://schemas.openxmlformats.org/drawingml/2006/main" xmlns:p="http://schemas.openxmlformats.org/presentationml/2006/main" xmlns:r="http://schemas.openxmlformats.org/officeDocument/2006/relationships" type="objOverTx" preserve="1">
+<p:sldLayout xmlns:a="http://schemas.openxmlformats.org/drawingml/2006/main" xmlns:r="http://schemas.openxmlformats.org/officeDocument/2006/relationships" xmlns:p="http://schemas.openxmlformats.org/presentationml/2006/main" type="objOverTx" preserve="1">
   <p:cSld name="Title, Content over Content">
     <p:spTree>
       <p:nvGrpSpPr>
@@ -1312,7 +1483,8 @@
           </a:prstGeom>
         </p:spPr>
         <p:txBody>
-          <a:bodyPr lIns="0" rIns="0" tIns="0" bIns="0" anchor="ctr"/>
+          <a:bodyPr lIns="0" tIns="0" rIns="0" bIns="0" anchor="ctr"/>
+          <a:lstStyle/>
           <a:p>
             <a:pPr algn="ctr"/>
             <a:endParaRPr/>
@@ -1339,7 +1511,8 @@
           </a:prstGeom>
         </p:spPr>
         <p:txBody>
-          <a:bodyPr lIns="0" rIns="0" tIns="0" bIns="0"/>
+          <a:bodyPr lIns="0" tIns="0" rIns="0" bIns="0"/>
+          <a:lstStyle/>
           <a:p>
             <a:endParaRPr/>
           </a:p>
@@ -1365,7 +1538,8 @@
           </a:prstGeom>
         </p:spPr>
         <p:txBody>
-          <a:bodyPr lIns="0" rIns="0" tIns="0" bIns="0"/>
+          <a:bodyPr lIns="0" tIns="0" rIns="0" bIns="0"/>
+          <a:lstStyle/>
           <a:p>
             <a:endParaRPr/>
           </a:p>
@@ -1373,11 +1547,14 @@
       </p:sp>
     </p:spTree>
   </p:cSld>
+  <p:clrMapOvr>
+    <a:masterClrMapping/>
+  </p:clrMapOvr>
 </p:sldLayout>
 </file>
 
 <file path=ppt/slideLayouts/slideLayout23.xml><?xml version="1.0" encoding="utf-8"?>
-<p:sldLayout xmlns:a="http://schemas.openxmlformats.org/drawingml/2006/main" xmlns:p="http://schemas.openxmlformats.org/presentationml/2006/main" xmlns:r="http://schemas.openxmlformats.org/officeDocument/2006/relationships" type="fourObj" preserve="1">
+<p:sldLayout xmlns:a="http://schemas.openxmlformats.org/drawingml/2006/main" xmlns:r="http://schemas.openxmlformats.org/officeDocument/2006/relationships" xmlns:p="http://schemas.openxmlformats.org/presentationml/2006/main" type="fourObj" preserve="1">
   <p:cSld name="Title, 4 Content">
     <p:spTree>
       <p:nvGrpSpPr>
@@ -1413,7 +1590,8 @@
           </a:prstGeom>
         </p:spPr>
         <p:txBody>
-          <a:bodyPr lIns="0" rIns="0" tIns="0" bIns="0" anchor="ctr"/>
+          <a:bodyPr lIns="0" tIns="0" rIns="0" bIns="0" anchor="ctr"/>
+          <a:lstStyle/>
           <a:p>
             <a:pPr algn="ctr"/>
             <a:endParaRPr/>
@@ -1440,7 +1618,8 @@
           </a:prstGeom>
         </p:spPr>
         <p:txBody>
-          <a:bodyPr lIns="0" rIns="0" tIns="0" bIns="0"/>
+          <a:bodyPr lIns="0" tIns="0" rIns="0" bIns="0"/>
+          <a:lstStyle/>
           <a:p>
             <a:endParaRPr/>
           </a:p>
@@ -1466,7 +1645,8 @@
           </a:prstGeom>
         </p:spPr>
         <p:txBody>
-          <a:bodyPr lIns="0" rIns="0" tIns="0" bIns="0"/>
+          <a:bodyPr lIns="0" tIns="0" rIns="0" bIns="0"/>
+          <a:lstStyle/>
           <a:p>
             <a:endParaRPr/>
           </a:p>
@@ -1492,7 +1672,8 @@
           </a:prstGeom>
         </p:spPr>
         <p:txBody>
-          <a:bodyPr lIns="0" rIns="0" tIns="0" bIns="0"/>
+          <a:bodyPr lIns="0" tIns="0" rIns="0" bIns="0"/>
+          <a:lstStyle/>
           <a:p>
             <a:endParaRPr/>
           </a:p>
@@ -1518,7 +1699,8 @@
           </a:prstGeom>
         </p:spPr>
         <p:txBody>
-          <a:bodyPr lIns="0" rIns="0" tIns="0" bIns="0"/>
+          <a:bodyPr lIns="0" tIns="0" rIns="0" bIns="0"/>
+          <a:lstStyle/>
           <a:p>
             <a:endParaRPr/>
           </a:p>
@@ -1526,11 +1708,14 @@
       </p:sp>
     </p:spTree>
   </p:cSld>
+  <p:clrMapOvr>
+    <a:masterClrMapping/>
+  </p:clrMapOvr>
 </p:sldLayout>
 </file>
 
 <file path=ppt/slideLayouts/slideLayout24.xml><?xml version="1.0" encoding="utf-8"?>
-<p:sldLayout xmlns:a="http://schemas.openxmlformats.org/drawingml/2006/main" xmlns:p="http://schemas.openxmlformats.org/presentationml/2006/main" xmlns:r="http://schemas.openxmlformats.org/officeDocument/2006/relationships" type="blank" preserve="1">
+<p:sldLayout xmlns:a="http://schemas.openxmlformats.org/drawingml/2006/main" xmlns:r="http://schemas.openxmlformats.org/officeDocument/2006/relationships" xmlns:p="http://schemas.openxmlformats.org/presentationml/2006/main" type="blank" preserve="1">
   <p:cSld name="Title, 6 Content">
     <p:spTree>
       <p:nvGrpSpPr>
@@ -1566,7 +1751,8 @@
           </a:prstGeom>
         </p:spPr>
         <p:txBody>
-          <a:bodyPr lIns="0" rIns="0" tIns="0" bIns="0" anchor="ctr"/>
+          <a:bodyPr lIns="0" tIns="0" rIns="0" bIns="0" anchor="ctr"/>
+          <a:lstStyle/>
           <a:p>
             <a:pPr algn="ctr"/>
             <a:endParaRPr/>
@@ -1593,7 +1779,8 @@
           </a:prstGeom>
         </p:spPr>
         <p:txBody>
-          <a:bodyPr lIns="0" rIns="0" tIns="0" bIns="0"/>
+          <a:bodyPr lIns="0" tIns="0" rIns="0" bIns="0"/>
+          <a:lstStyle/>
           <a:p>
             <a:endParaRPr/>
           </a:p>
@@ -1619,7 +1806,8 @@
           </a:prstGeom>
         </p:spPr>
         <p:txBody>
-          <a:bodyPr lIns="0" rIns="0" tIns="0" bIns="0"/>
+          <a:bodyPr lIns="0" tIns="0" rIns="0" bIns="0"/>
+          <a:lstStyle/>
           <a:p>
             <a:endParaRPr/>
           </a:p>
@@ -1627,7 +1815,7 @@
       </p:sp>
       <p:pic>
         <p:nvPicPr>
-          <p:cNvPr id="85" name="" descr=""/>
+          <p:cNvPr id="85" name="84 Imagen"/>
           <p:cNvPicPr/>
           <p:nvPr/>
         </p:nvPicPr>
@@ -1652,12 +1840,12 @@
       </p:pic>
       <p:pic>
         <p:nvPicPr>
-          <p:cNvPr id="86" name="" descr=""/>
+          <p:cNvPr id="86" name="85 Imagen"/>
           <p:cNvPicPr/>
           <p:nvPr/>
         </p:nvPicPr>
         <p:blipFill>
-          <a:blip r:embed="rId3"/>
+          <a:blip r:embed="rId2"/>
           <a:stretch>
             <a:fillRect/>
           </a:stretch>
@@ -1677,11 +1865,14 @@
       </p:pic>
     </p:spTree>
   </p:cSld>
+  <p:clrMapOvr>
+    <a:masterClrMapping/>
+  </p:clrMapOvr>
 </p:sldLayout>
 </file>
 
 <file path=ppt/slideLayouts/slideLayout25.xml><?xml version="1.0" encoding="utf-8"?>
-<p:sldLayout xmlns:a="http://schemas.openxmlformats.org/drawingml/2006/main" xmlns:p="http://schemas.openxmlformats.org/presentationml/2006/main" xmlns:r="http://schemas.openxmlformats.org/officeDocument/2006/relationships" type="blank" preserve="1">
+<p:sldLayout xmlns:a="http://schemas.openxmlformats.org/drawingml/2006/main" xmlns:r="http://schemas.openxmlformats.org/officeDocument/2006/relationships" xmlns:p="http://schemas.openxmlformats.org/presentationml/2006/main" type="blank" preserve="1">
   <p:cSld name="Blank Slide">
     <p:spTree>
       <p:nvGrpSpPr>
@@ -1699,11 +1890,14 @@
       </p:grpSpPr>
     </p:spTree>
   </p:cSld>
+  <p:clrMapOvr>
+    <a:masterClrMapping/>
+  </p:clrMapOvr>
 </p:sldLayout>
 </file>
 
 <file path=ppt/slideLayouts/slideLayout26.xml><?xml version="1.0" encoding="utf-8"?>
-<p:sldLayout xmlns:a="http://schemas.openxmlformats.org/drawingml/2006/main" xmlns:p="http://schemas.openxmlformats.org/presentationml/2006/main" xmlns:r="http://schemas.openxmlformats.org/officeDocument/2006/relationships" type="tx" preserve="1">
+<p:sldLayout xmlns:a="http://schemas.openxmlformats.org/drawingml/2006/main" xmlns:r="http://schemas.openxmlformats.org/officeDocument/2006/relationships" xmlns:p="http://schemas.openxmlformats.org/presentationml/2006/main" type="tx" preserve="1">
   <p:cSld name="Title Slide">
     <p:spTree>
       <p:nvGrpSpPr>
@@ -1739,7 +1933,8 @@
           </a:prstGeom>
         </p:spPr>
         <p:txBody>
-          <a:bodyPr lIns="0" rIns="0" tIns="0" bIns="0" anchor="ctr"/>
+          <a:bodyPr lIns="0" tIns="0" rIns="0" bIns="0" anchor="ctr"/>
+          <a:lstStyle/>
           <a:p>
             <a:pPr algn="ctr"/>
             <a:endParaRPr/>
@@ -1766,7 +1961,8 @@
           </a:prstGeom>
         </p:spPr>
         <p:txBody>
-          <a:bodyPr lIns="0" rIns="0" tIns="0" bIns="0" anchor="ctr"/>
+          <a:bodyPr lIns="0" tIns="0" rIns="0" bIns="0" anchor="ctr"/>
+          <a:lstStyle/>
           <a:p>
             <a:pPr algn="ctr"/>
             <a:endParaRPr/>
@@ -1775,11 +1971,14 @@
       </p:sp>
     </p:spTree>
   </p:cSld>
+  <p:clrMapOvr>
+    <a:masterClrMapping/>
+  </p:clrMapOvr>
 </p:sldLayout>
 </file>
 
 <file path=ppt/slideLayouts/slideLayout27.xml><?xml version="1.0" encoding="utf-8"?>
-<p:sldLayout xmlns:a="http://schemas.openxmlformats.org/drawingml/2006/main" xmlns:p="http://schemas.openxmlformats.org/presentationml/2006/main" xmlns:r="http://schemas.openxmlformats.org/officeDocument/2006/relationships" type="obj" preserve="1">
+<p:sldLayout xmlns:a="http://schemas.openxmlformats.org/drawingml/2006/main" xmlns:r="http://schemas.openxmlformats.org/officeDocument/2006/relationships" xmlns:p="http://schemas.openxmlformats.org/presentationml/2006/main" type="obj" preserve="1">
   <p:cSld name="Title, Content">
     <p:spTree>
       <p:nvGrpSpPr>
@@ -1815,7 +2014,8 @@
           </a:prstGeom>
         </p:spPr>
         <p:txBody>
-          <a:bodyPr lIns="0" rIns="0" tIns="0" bIns="0" anchor="ctr"/>
+          <a:bodyPr lIns="0" tIns="0" rIns="0" bIns="0" anchor="ctr"/>
+          <a:lstStyle/>
           <a:p>
             <a:pPr algn="ctr"/>
             <a:endParaRPr/>
@@ -1842,7 +2042,8 @@
           </a:prstGeom>
         </p:spPr>
         <p:txBody>
-          <a:bodyPr lIns="0" rIns="0" tIns="0" bIns="0"/>
+          <a:bodyPr lIns="0" tIns="0" rIns="0" bIns="0"/>
+          <a:lstStyle/>
           <a:p>
             <a:endParaRPr/>
           </a:p>
@@ -1850,11 +2051,14 @@
       </p:sp>
     </p:spTree>
   </p:cSld>
+  <p:clrMapOvr>
+    <a:masterClrMapping/>
+  </p:clrMapOvr>
 </p:sldLayout>
 </file>
 
 <file path=ppt/slideLayouts/slideLayout28.xml><?xml version="1.0" encoding="utf-8"?>
-<p:sldLayout xmlns:a="http://schemas.openxmlformats.org/drawingml/2006/main" xmlns:p="http://schemas.openxmlformats.org/presentationml/2006/main" xmlns:r="http://schemas.openxmlformats.org/officeDocument/2006/relationships" type="twoObj" preserve="1">
+<p:sldLayout xmlns:a="http://schemas.openxmlformats.org/drawingml/2006/main" xmlns:r="http://schemas.openxmlformats.org/officeDocument/2006/relationships" xmlns:p="http://schemas.openxmlformats.org/presentationml/2006/main" type="twoObj" preserve="1">
   <p:cSld name="Title, 2 Content">
     <p:spTree>
       <p:nvGrpSpPr>
@@ -1890,7 +2094,8 @@
           </a:prstGeom>
         </p:spPr>
         <p:txBody>
-          <a:bodyPr lIns="0" rIns="0" tIns="0" bIns="0" anchor="ctr"/>
+          <a:bodyPr lIns="0" tIns="0" rIns="0" bIns="0" anchor="ctr"/>
+          <a:lstStyle/>
           <a:p>
             <a:pPr algn="ctr"/>
             <a:endParaRPr/>
@@ -1917,7 +2122,8 @@
           </a:prstGeom>
         </p:spPr>
         <p:txBody>
-          <a:bodyPr lIns="0" rIns="0" tIns="0" bIns="0"/>
+          <a:bodyPr lIns="0" tIns="0" rIns="0" bIns="0"/>
+          <a:lstStyle/>
           <a:p>
             <a:endParaRPr/>
           </a:p>
@@ -1943,7 +2149,8 @@
           </a:prstGeom>
         </p:spPr>
         <p:txBody>
-          <a:bodyPr lIns="0" rIns="0" tIns="0" bIns="0"/>
+          <a:bodyPr lIns="0" tIns="0" rIns="0" bIns="0"/>
+          <a:lstStyle/>
           <a:p>
             <a:endParaRPr/>
           </a:p>
@@ -1951,11 +2158,14 @@
       </p:sp>
     </p:spTree>
   </p:cSld>
+  <p:clrMapOvr>
+    <a:masterClrMapping/>
+  </p:clrMapOvr>
 </p:sldLayout>
 </file>
 
 <file path=ppt/slideLayouts/slideLayout29.xml><?xml version="1.0" encoding="utf-8"?>
-<p:sldLayout xmlns:a="http://schemas.openxmlformats.org/drawingml/2006/main" xmlns:p="http://schemas.openxmlformats.org/presentationml/2006/main" xmlns:r="http://schemas.openxmlformats.org/officeDocument/2006/relationships" type="titleOnly" preserve="1">
+<p:sldLayout xmlns:a="http://schemas.openxmlformats.org/drawingml/2006/main" xmlns:r="http://schemas.openxmlformats.org/officeDocument/2006/relationships" xmlns:p="http://schemas.openxmlformats.org/presentationml/2006/main" type="titleOnly" preserve="1">
   <p:cSld name="Title Only">
     <p:spTree>
       <p:nvGrpSpPr>
@@ -1991,7 +2201,8 @@
           </a:prstGeom>
         </p:spPr>
         <p:txBody>
-          <a:bodyPr lIns="0" rIns="0" tIns="0" bIns="0" anchor="ctr"/>
+          <a:bodyPr lIns="0" tIns="0" rIns="0" bIns="0" anchor="ctr"/>
+          <a:lstStyle/>
           <a:p>
             <a:pPr algn="ctr"/>
             <a:endParaRPr/>
@@ -2000,11 +2211,14 @@
       </p:sp>
     </p:spTree>
   </p:cSld>
+  <p:clrMapOvr>
+    <a:masterClrMapping/>
+  </p:clrMapOvr>
 </p:sldLayout>
 </file>
 
 <file path=ppt/slideLayouts/slideLayout3.xml><?xml version="1.0" encoding="utf-8"?>
-<p:sldLayout xmlns:a="http://schemas.openxmlformats.org/drawingml/2006/main" xmlns:p="http://schemas.openxmlformats.org/presentationml/2006/main" xmlns:r="http://schemas.openxmlformats.org/officeDocument/2006/relationships" type="obj" preserve="1">
+<p:sldLayout xmlns:a="http://schemas.openxmlformats.org/drawingml/2006/main" xmlns:r="http://schemas.openxmlformats.org/officeDocument/2006/relationships" xmlns:p="http://schemas.openxmlformats.org/presentationml/2006/main" type="obj" preserve="1">
   <p:cSld name="Title, Content">
     <p:spTree>
       <p:nvGrpSpPr>
@@ -2040,7 +2254,8 @@
           </a:prstGeom>
         </p:spPr>
         <p:txBody>
-          <a:bodyPr lIns="0" rIns="0" tIns="0" bIns="0" anchor="ctr"/>
+          <a:bodyPr lIns="0" tIns="0" rIns="0" bIns="0" anchor="ctr"/>
+          <a:lstStyle/>
           <a:p>
             <a:pPr algn="ctr"/>
             <a:endParaRPr/>
@@ -2067,7 +2282,8 @@
           </a:prstGeom>
         </p:spPr>
         <p:txBody>
-          <a:bodyPr lIns="0" rIns="0" tIns="0" bIns="0"/>
+          <a:bodyPr lIns="0" tIns="0" rIns="0" bIns="0"/>
+          <a:lstStyle/>
           <a:p>
             <a:endParaRPr/>
           </a:p>
@@ -2075,11 +2291,14 @@
       </p:sp>
     </p:spTree>
   </p:cSld>
+  <p:clrMapOvr>
+    <a:masterClrMapping/>
+  </p:clrMapOvr>
 </p:sldLayout>
 </file>
 
 <file path=ppt/slideLayouts/slideLayout30.xml><?xml version="1.0" encoding="utf-8"?>
-<p:sldLayout xmlns:a="http://schemas.openxmlformats.org/drawingml/2006/main" xmlns:p="http://schemas.openxmlformats.org/presentationml/2006/main" xmlns:r="http://schemas.openxmlformats.org/officeDocument/2006/relationships" type="objOnly" preserve="1">
+<p:sldLayout xmlns:a="http://schemas.openxmlformats.org/drawingml/2006/main" xmlns:r="http://schemas.openxmlformats.org/officeDocument/2006/relationships" xmlns:p="http://schemas.openxmlformats.org/presentationml/2006/main" type="objOnly" preserve="1">
   <p:cSld name="Centered Text">
     <p:spTree>
       <p:nvGrpSpPr>
@@ -2115,7 +2334,8 @@
           </a:prstGeom>
         </p:spPr>
         <p:txBody>
-          <a:bodyPr lIns="0" rIns="0" tIns="0" bIns="0" anchor="ctr"/>
+          <a:bodyPr lIns="0" tIns="0" rIns="0" bIns="0" anchor="ctr"/>
+          <a:lstStyle/>
           <a:p>
             <a:pPr algn="ctr"/>
             <a:endParaRPr/>
@@ -2124,11 +2344,14 @@
       </p:sp>
     </p:spTree>
   </p:cSld>
+  <p:clrMapOvr>
+    <a:masterClrMapping/>
+  </p:clrMapOvr>
 </p:sldLayout>
 </file>
 
 <file path=ppt/slideLayouts/slideLayout31.xml><?xml version="1.0" encoding="utf-8"?>
-<p:sldLayout xmlns:a="http://schemas.openxmlformats.org/drawingml/2006/main" xmlns:p="http://schemas.openxmlformats.org/presentationml/2006/main" xmlns:r="http://schemas.openxmlformats.org/officeDocument/2006/relationships" type="twoObjAndObj" preserve="1">
+<p:sldLayout xmlns:a="http://schemas.openxmlformats.org/drawingml/2006/main" xmlns:r="http://schemas.openxmlformats.org/officeDocument/2006/relationships" xmlns:p="http://schemas.openxmlformats.org/presentationml/2006/main" type="twoObjAndObj" preserve="1">
   <p:cSld name="Title, 2 Content and Content">
     <p:spTree>
       <p:nvGrpSpPr>
@@ -2164,7 +2387,8 @@
           </a:prstGeom>
         </p:spPr>
         <p:txBody>
-          <a:bodyPr lIns="0" rIns="0" tIns="0" bIns="0" anchor="ctr"/>
+          <a:bodyPr lIns="0" tIns="0" rIns="0" bIns="0" anchor="ctr"/>
+          <a:lstStyle/>
           <a:p>
             <a:pPr algn="ctr"/>
             <a:endParaRPr/>
@@ -2191,7 +2415,8 @@
           </a:prstGeom>
         </p:spPr>
         <p:txBody>
-          <a:bodyPr lIns="0" rIns="0" tIns="0" bIns="0"/>
+          <a:bodyPr lIns="0" tIns="0" rIns="0" bIns="0"/>
+          <a:lstStyle/>
           <a:p>
             <a:endParaRPr/>
           </a:p>
@@ -2217,7 +2442,8 @@
           </a:prstGeom>
         </p:spPr>
         <p:txBody>
-          <a:bodyPr lIns="0" rIns="0" tIns="0" bIns="0"/>
+          <a:bodyPr lIns="0" tIns="0" rIns="0" bIns="0"/>
+          <a:lstStyle/>
           <a:p>
             <a:endParaRPr/>
           </a:p>
@@ -2243,7 +2469,8 @@
           </a:prstGeom>
         </p:spPr>
         <p:txBody>
-          <a:bodyPr lIns="0" rIns="0" tIns="0" bIns="0"/>
+          <a:bodyPr lIns="0" tIns="0" rIns="0" bIns="0"/>
+          <a:lstStyle/>
           <a:p>
             <a:endParaRPr/>
           </a:p>
@@ -2251,11 +2478,14 @@
       </p:sp>
     </p:spTree>
   </p:cSld>
+  <p:clrMapOvr>
+    <a:masterClrMapping/>
+  </p:clrMapOvr>
 </p:sldLayout>
 </file>
 
 <file path=ppt/slideLayouts/slideLayout32.xml><?xml version="1.0" encoding="utf-8"?>
-<p:sldLayout xmlns:a="http://schemas.openxmlformats.org/drawingml/2006/main" xmlns:p="http://schemas.openxmlformats.org/presentationml/2006/main" xmlns:r="http://schemas.openxmlformats.org/officeDocument/2006/relationships" type="objAndTwoObj" preserve="1">
+<p:sldLayout xmlns:a="http://schemas.openxmlformats.org/drawingml/2006/main" xmlns:r="http://schemas.openxmlformats.org/officeDocument/2006/relationships" xmlns:p="http://schemas.openxmlformats.org/presentationml/2006/main" type="objAndTwoObj" preserve="1">
   <p:cSld name="Title Content and 2 Content">
     <p:spTree>
       <p:nvGrpSpPr>
@@ -2291,7 +2521,8 @@
           </a:prstGeom>
         </p:spPr>
         <p:txBody>
-          <a:bodyPr lIns="0" rIns="0" tIns="0" bIns="0" anchor="ctr"/>
+          <a:bodyPr lIns="0" tIns="0" rIns="0" bIns="0" anchor="ctr"/>
+          <a:lstStyle/>
           <a:p>
             <a:pPr algn="ctr"/>
             <a:endParaRPr/>
@@ -2318,7 +2549,8 @@
           </a:prstGeom>
         </p:spPr>
         <p:txBody>
-          <a:bodyPr lIns="0" rIns="0" tIns="0" bIns="0"/>
+          <a:bodyPr lIns="0" tIns="0" rIns="0" bIns="0"/>
+          <a:lstStyle/>
           <a:p>
             <a:endParaRPr/>
           </a:p>
@@ -2344,7 +2576,8 @@
           </a:prstGeom>
         </p:spPr>
         <p:txBody>
-          <a:bodyPr lIns="0" rIns="0" tIns="0" bIns="0"/>
+          <a:bodyPr lIns="0" tIns="0" rIns="0" bIns="0"/>
+          <a:lstStyle/>
           <a:p>
             <a:endParaRPr/>
           </a:p>
@@ -2370,7 +2603,8 @@
           </a:prstGeom>
         </p:spPr>
         <p:txBody>
-          <a:bodyPr lIns="0" rIns="0" tIns="0" bIns="0"/>
+          <a:bodyPr lIns="0" tIns="0" rIns="0" bIns="0"/>
+          <a:lstStyle/>
           <a:p>
             <a:endParaRPr/>
           </a:p>
@@ -2378,11 +2612,14 @@
       </p:sp>
     </p:spTree>
   </p:cSld>
+  <p:clrMapOvr>
+    <a:masterClrMapping/>
+  </p:clrMapOvr>
 </p:sldLayout>
 </file>
 
 <file path=ppt/slideLayouts/slideLayout33.xml><?xml version="1.0" encoding="utf-8"?>
-<p:sldLayout xmlns:a="http://schemas.openxmlformats.org/drawingml/2006/main" xmlns:p="http://schemas.openxmlformats.org/presentationml/2006/main" xmlns:r="http://schemas.openxmlformats.org/officeDocument/2006/relationships" type="twoObjOverTx" preserve="1">
+<p:sldLayout xmlns:a="http://schemas.openxmlformats.org/drawingml/2006/main" xmlns:r="http://schemas.openxmlformats.org/officeDocument/2006/relationships" xmlns:p="http://schemas.openxmlformats.org/presentationml/2006/main" type="twoObjOverTx" preserve="1">
   <p:cSld name="Title, 2 Content over Content">
     <p:spTree>
       <p:nvGrpSpPr>
@@ -2418,7 +2655,8 @@
           </a:prstGeom>
         </p:spPr>
         <p:txBody>
-          <a:bodyPr lIns="0" rIns="0" tIns="0" bIns="0" anchor="ctr"/>
+          <a:bodyPr lIns="0" tIns="0" rIns="0" bIns="0" anchor="ctr"/>
+          <a:lstStyle/>
           <a:p>
             <a:pPr algn="ctr"/>
             <a:endParaRPr/>
@@ -2445,7 +2683,8 @@
           </a:prstGeom>
         </p:spPr>
         <p:txBody>
-          <a:bodyPr lIns="0" rIns="0" tIns="0" bIns="0"/>
+          <a:bodyPr lIns="0" tIns="0" rIns="0" bIns="0"/>
+          <a:lstStyle/>
           <a:p>
             <a:endParaRPr/>
           </a:p>
@@ -2471,7 +2710,8 @@
           </a:prstGeom>
         </p:spPr>
         <p:txBody>
-          <a:bodyPr lIns="0" rIns="0" tIns="0" bIns="0"/>
+          <a:bodyPr lIns="0" tIns="0" rIns="0" bIns="0"/>
+          <a:lstStyle/>
           <a:p>
             <a:endParaRPr/>
           </a:p>
@@ -2497,7 +2737,8 @@
           </a:prstGeom>
         </p:spPr>
         <p:txBody>
-          <a:bodyPr lIns="0" rIns="0" tIns="0" bIns="0"/>
+          <a:bodyPr lIns="0" tIns="0" rIns="0" bIns="0"/>
+          <a:lstStyle/>
           <a:p>
             <a:endParaRPr/>
           </a:p>
@@ -2505,11 +2746,14 @@
       </p:sp>
     </p:spTree>
   </p:cSld>
+  <p:clrMapOvr>
+    <a:masterClrMapping/>
+  </p:clrMapOvr>
 </p:sldLayout>
 </file>
 
 <file path=ppt/slideLayouts/slideLayout34.xml><?xml version="1.0" encoding="utf-8"?>
-<p:sldLayout xmlns:a="http://schemas.openxmlformats.org/drawingml/2006/main" xmlns:p="http://schemas.openxmlformats.org/presentationml/2006/main" xmlns:r="http://schemas.openxmlformats.org/officeDocument/2006/relationships" type="objOverTx" preserve="1">
+<p:sldLayout xmlns:a="http://schemas.openxmlformats.org/drawingml/2006/main" xmlns:r="http://schemas.openxmlformats.org/officeDocument/2006/relationships" xmlns:p="http://schemas.openxmlformats.org/presentationml/2006/main" type="objOverTx" preserve="1">
   <p:cSld name="Title, Content over Content">
     <p:spTree>
       <p:nvGrpSpPr>
@@ -2545,7 +2789,8 @@
           </a:prstGeom>
         </p:spPr>
         <p:txBody>
-          <a:bodyPr lIns="0" rIns="0" tIns="0" bIns="0" anchor="ctr"/>
+          <a:bodyPr lIns="0" tIns="0" rIns="0" bIns="0" anchor="ctr"/>
+          <a:lstStyle/>
           <a:p>
             <a:pPr algn="ctr"/>
             <a:endParaRPr/>
@@ -2572,7 +2817,8 @@
           </a:prstGeom>
         </p:spPr>
         <p:txBody>
-          <a:bodyPr lIns="0" rIns="0" tIns="0" bIns="0"/>
+          <a:bodyPr lIns="0" tIns="0" rIns="0" bIns="0"/>
+          <a:lstStyle/>
           <a:p>
             <a:endParaRPr/>
           </a:p>
@@ -2598,7 +2844,8 @@
           </a:prstGeom>
         </p:spPr>
         <p:txBody>
-          <a:bodyPr lIns="0" rIns="0" tIns="0" bIns="0"/>
+          <a:bodyPr lIns="0" tIns="0" rIns="0" bIns="0"/>
+          <a:lstStyle/>
           <a:p>
             <a:endParaRPr/>
           </a:p>
@@ -2606,11 +2853,14 @@
       </p:sp>
     </p:spTree>
   </p:cSld>
+  <p:clrMapOvr>
+    <a:masterClrMapping/>
+  </p:clrMapOvr>
 </p:sldLayout>
 </file>
 
 <file path=ppt/slideLayouts/slideLayout35.xml><?xml version="1.0" encoding="utf-8"?>
-<p:sldLayout xmlns:a="http://schemas.openxmlformats.org/drawingml/2006/main" xmlns:p="http://schemas.openxmlformats.org/presentationml/2006/main" xmlns:r="http://schemas.openxmlformats.org/officeDocument/2006/relationships" type="fourObj" preserve="1">
+<p:sldLayout xmlns:a="http://schemas.openxmlformats.org/drawingml/2006/main" xmlns:r="http://schemas.openxmlformats.org/officeDocument/2006/relationships" xmlns:p="http://schemas.openxmlformats.org/presentationml/2006/main" type="fourObj" preserve="1">
   <p:cSld name="Title, 4 Content">
     <p:spTree>
       <p:nvGrpSpPr>
@@ -2646,7 +2896,8 @@
           </a:prstGeom>
         </p:spPr>
         <p:txBody>
-          <a:bodyPr lIns="0" rIns="0" tIns="0" bIns="0" anchor="ctr"/>
+          <a:bodyPr lIns="0" tIns="0" rIns="0" bIns="0" anchor="ctr"/>
+          <a:lstStyle/>
           <a:p>
             <a:pPr algn="ctr"/>
             <a:endParaRPr/>
@@ -2673,7 +2924,8 @@
           </a:prstGeom>
         </p:spPr>
         <p:txBody>
-          <a:bodyPr lIns="0" rIns="0" tIns="0" bIns="0"/>
+          <a:bodyPr lIns="0" tIns="0" rIns="0" bIns="0"/>
+          <a:lstStyle/>
           <a:p>
             <a:endParaRPr/>
           </a:p>
@@ -2699,7 +2951,8 @@
           </a:prstGeom>
         </p:spPr>
         <p:txBody>
-          <a:bodyPr lIns="0" rIns="0" tIns="0" bIns="0"/>
+          <a:bodyPr lIns="0" tIns="0" rIns="0" bIns="0"/>
+          <a:lstStyle/>
           <a:p>
             <a:endParaRPr/>
           </a:p>
@@ -2725,7 +2978,8 @@
           </a:prstGeom>
         </p:spPr>
         <p:txBody>
-          <a:bodyPr lIns="0" rIns="0" tIns="0" bIns="0"/>
+          <a:bodyPr lIns="0" tIns="0" rIns="0" bIns="0"/>
+          <a:lstStyle/>
           <a:p>
             <a:endParaRPr/>
           </a:p>
@@ -2751,7 +3005,8 @@
           </a:prstGeom>
         </p:spPr>
         <p:txBody>
-          <a:bodyPr lIns="0" rIns="0" tIns="0" bIns="0"/>
+          <a:bodyPr lIns="0" tIns="0" rIns="0" bIns="0"/>
+          <a:lstStyle/>
           <a:p>
             <a:endParaRPr/>
           </a:p>
@@ -2759,11 +3014,14 @@
       </p:sp>
     </p:spTree>
   </p:cSld>
+  <p:clrMapOvr>
+    <a:masterClrMapping/>
+  </p:clrMapOvr>
 </p:sldLayout>
 </file>
 
 <file path=ppt/slideLayouts/slideLayout36.xml><?xml version="1.0" encoding="utf-8"?>
-<p:sldLayout xmlns:a="http://schemas.openxmlformats.org/drawingml/2006/main" xmlns:p="http://schemas.openxmlformats.org/presentationml/2006/main" xmlns:r="http://schemas.openxmlformats.org/officeDocument/2006/relationships" type="blank" preserve="1">
+<p:sldLayout xmlns:a="http://schemas.openxmlformats.org/drawingml/2006/main" xmlns:r="http://schemas.openxmlformats.org/officeDocument/2006/relationships" xmlns:p="http://schemas.openxmlformats.org/presentationml/2006/main" type="blank" preserve="1">
   <p:cSld name="Title, 6 Content">
     <p:spTree>
       <p:nvGrpSpPr>
@@ -2799,7 +3057,8 @@
           </a:prstGeom>
         </p:spPr>
         <p:txBody>
-          <a:bodyPr lIns="0" rIns="0" tIns="0" bIns="0" anchor="ctr"/>
+          <a:bodyPr lIns="0" tIns="0" rIns="0" bIns="0" anchor="ctr"/>
+          <a:lstStyle/>
           <a:p>
             <a:pPr algn="ctr"/>
             <a:endParaRPr/>
@@ -2826,7 +3085,8 @@
           </a:prstGeom>
         </p:spPr>
         <p:txBody>
-          <a:bodyPr lIns="0" rIns="0" tIns="0" bIns="0"/>
+          <a:bodyPr lIns="0" tIns="0" rIns="0" bIns="0"/>
+          <a:lstStyle/>
           <a:p>
             <a:endParaRPr/>
           </a:p>
@@ -2852,7 +3112,8 @@
           </a:prstGeom>
         </p:spPr>
         <p:txBody>
-          <a:bodyPr lIns="0" rIns="0" tIns="0" bIns="0"/>
+          <a:bodyPr lIns="0" tIns="0" rIns="0" bIns="0"/>
+          <a:lstStyle/>
           <a:p>
             <a:endParaRPr/>
           </a:p>
@@ -2860,7 +3121,7 @@
       </p:sp>
       <p:pic>
         <p:nvPicPr>
-          <p:cNvPr id="125" name="" descr=""/>
+          <p:cNvPr id="125" name="124 Imagen"/>
           <p:cNvPicPr/>
           <p:nvPr/>
         </p:nvPicPr>
@@ -2885,12 +3146,12 @@
       </p:pic>
       <p:pic>
         <p:nvPicPr>
-          <p:cNvPr id="126" name="" descr=""/>
+          <p:cNvPr id="126" name="125 Imagen"/>
           <p:cNvPicPr/>
           <p:nvPr/>
         </p:nvPicPr>
         <p:blipFill>
-          <a:blip r:embed="rId3"/>
+          <a:blip r:embed="rId2"/>
           <a:stretch>
             <a:fillRect/>
           </a:stretch>
@@ -2910,11 +3171,14 @@
       </p:pic>
     </p:spTree>
   </p:cSld>
+  <p:clrMapOvr>
+    <a:masterClrMapping/>
+  </p:clrMapOvr>
 </p:sldLayout>
 </file>
 
 <file path=ppt/slideLayouts/slideLayout4.xml><?xml version="1.0" encoding="utf-8"?>
-<p:sldLayout xmlns:a="http://schemas.openxmlformats.org/drawingml/2006/main" xmlns:p="http://schemas.openxmlformats.org/presentationml/2006/main" xmlns:r="http://schemas.openxmlformats.org/officeDocument/2006/relationships" type="twoObj" preserve="1">
+<p:sldLayout xmlns:a="http://schemas.openxmlformats.org/drawingml/2006/main" xmlns:r="http://schemas.openxmlformats.org/officeDocument/2006/relationships" xmlns:p="http://schemas.openxmlformats.org/presentationml/2006/main" type="twoObj" preserve="1">
   <p:cSld name="Title, 2 Content">
     <p:spTree>
       <p:nvGrpSpPr>
@@ -2950,7 +3214,8 @@
           </a:prstGeom>
         </p:spPr>
         <p:txBody>
-          <a:bodyPr lIns="0" rIns="0" tIns="0" bIns="0" anchor="ctr"/>
+          <a:bodyPr lIns="0" tIns="0" rIns="0" bIns="0" anchor="ctr"/>
+          <a:lstStyle/>
           <a:p>
             <a:pPr algn="ctr"/>
             <a:endParaRPr/>
@@ -2977,7 +3242,8 @@
           </a:prstGeom>
         </p:spPr>
         <p:txBody>
-          <a:bodyPr lIns="0" rIns="0" tIns="0" bIns="0"/>
+          <a:bodyPr lIns="0" tIns="0" rIns="0" bIns="0"/>
+          <a:lstStyle/>
           <a:p>
             <a:endParaRPr/>
           </a:p>
@@ -3003,7 +3269,8 @@
           </a:prstGeom>
         </p:spPr>
         <p:txBody>
-          <a:bodyPr lIns="0" rIns="0" tIns="0" bIns="0"/>
+          <a:bodyPr lIns="0" tIns="0" rIns="0" bIns="0"/>
+          <a:lstStyle/>
           <a:p>
             <a:endParaRPr/>
           </a:p>
@@ -3011,11 +3278,14 @@
       </p:sp>
     </p:spTree>
   </p:cSld>
+  <p:clrMapOvr>
+    <a:masterClrMapping/>
+  </p:clrMapOvr>
 </p:sldLayout>
 </file>
 
 <file path=ppt/slideLayouts/slideLayout5.xml><?xml version="1.0" encoding="utf-8"?>
-<p:sldLayout xmlns:a="http://schemas.openxmlformats.org/drawingml/2006/main" xmlns:p="http://schemas.openxmlformats.org/presentationml/2006/main" xmlns:r="http://schemas.openxmlformats.org/officeDocument/2006/relationships" type="titleOnly" preserve="1">
+<p:sldLayout xmlns:a="http://schemas.openxmlformats.org/drawingml/2006/main" xmlns:r="http://schemas.openxmlformats.org/officeDocument/2006/relationships" xmlns:p="http://schemas.openxmlformats.org/presentationml/2006/main" type="titleOnly" preserve="1">
   <p:cSld name="Title Only">
     <p:spTree>
       <p:nvGrpSpPr>
@@ -3051,7 +3321,8 @@
           </a:prstGeom>
         </p:spPr>
         <p:txBody>
-          <a:bodyPr lIns="0" rIns="0" tIns="0" bIns="0" anchor="ctr"/>
+          <a:bodyPr lIns="0" tIns="0" rIns="0" bIns="0" anchor="ctr"/>
+          <a:lstStyle/>
           <a:p>
             <a:pPr algn="ctr"/>
             <a:endParaRPr/>
@@ -3060,11 +3331,14 @@
       </p:sp>
     </p:spTree>
   </p:cSld>
+  <p:clrMapOvr>
+    <a:masterClrMapping/>
+  </p:clrMapOvr>
 </p:sldLayout>
 </file>
 
 <file path=ppt/slideLayouts/slideLayout6.xml><?xml version="1.0" encoding="utf-8"?>
-<p:sldLayout xmlns:a="http://schemas.openxmlformats.org/drawingml/2006/main" xmlns:p="http://schemas.openxmlformats.org/presentationml/2006/main" xmlns:r="http://schemas.openxmlformats.org/officeDocument/2006/relationships" type="objOnly" preserve="1">
+<p:sldLayout xmlns:a="http://schemas.openxmlformats.org/drawingml/2006/main" xmlns:r="http://schemas.openxmlformats.org/officeDocument/2006/relationships" xmlns:p="http://schemas.openxmlformats.org/presentationml/2006/main" type="objOnly" preserve="1">
   <p:cSld name="Centered Text">
     <p:spTree>
       <p:nvGrpSpPr>
@@ -3100,7 +3374,8 @@
           </a:prstGeom>
         </p:spPr>
         <p:txBody>
-          <a:bodyPr lIns="0" rIns="0" tIns="0" bIns="0" anchor="ctr"/>
+          <a:bodyPr lIns="0" tIns="0" rIns="0" bIns="0" anchor="ctr"/>
+          <a:lstStyle/>
           <a:p>
             <a:pPr algn="ctr"/>
             <a:endParaRPr/>
@@ -3109,11 +3384,14 @@
       </p:sp>
     </p:spTree>
   </p:cSld>
+  <p:clrMapOvr>
+    <a:masterClrMapping/>
+  </p:clrMapOvr>
 </p:sldLayout>
 </file>
 
 <file path=ppt/slideLayouts/slideLayout7.xml><?xml version="1.0" encoding="utf-8"?>
-<p:sldLayout xmlns:a="http://schemas.openxmlformats.org/drawingml/2006/main" xmlns:p="http://schemas.openxmlformats.org/presentationml/2006/main" xmlns:r="http://schemas.openxmlformats.org/officeDocument/2006/relationships" type="twoObjAndObj" preserve="1">
+<p:sldLayout xmlns:a="http://schemas.openxmlformats.org/drawingml/2006/main" xmlns:r="http://schemas.openxmlformats.org/officeDocument/2006/relationships" xmlns:p="http://schemas.openxmlformats.org/presentationml/2006/main" type="twoObjAndObj" preserve="1">
   <p:cSld name="Title, 2 Content and Content">
     <p:spTree>
       <p:nvGrpSpPr>
@@ -3149,7 +3427,8 @@
           </a:prstGeom>
         </p:spPr>
         <p:txBody>
-          <a:bodyPr lIns="0" rIns="0" tIns="0" bIns="0" anchor="ctr"/>
+          <a:bodyPr lIns="0" tIns="0" rIns="0" bIns="0" anchor="ctr"/>
+          <a:lstStyle/>
           <a:p>
             <a:pPr algn="ctr"/>
             <a:endParaRPr/>
@@ -3176,7 +3455,8 @@
           </a:prstGeom>
         </p:spPr>
         <p:txBody>
-          <a:bodyPr lIns="0" rIns="0" tIns="0" bIns="0"/>
+          <a:bodyPr lIns="0" tIns="0" rIns="0" bIns="0"/>
+          <a:lstStyle/>
           <a:p>
             <a:endParaRPr/>
           </a:p>
@@ -3202,7 +3482,8 @@
           </a:prstGeom>
         </p:spPr>
         <p:txBody>
-          <a:bodyPr lIns="0" rIns="0" tIns="0" bIns="0"/>
+          <a:bodyPr lIns="0" tIns="0" rIns="0" bIns="0"/>
+          <a:lstStyle/>
           <a:p>
             <a:endParaRPr/>
           </a:p>
@@ -3228,7 +3509,8 @@
           </a:prstGeom>
         </p:spPr>
         <p:txBody>
-          <a:bodyPr lIns="0" rIns="0" tIns="0" bIns="0"/>
+          <a:bodyPr lIns="0" tIns="0" rIns="0" bIns="0"/>
+          <a:lstStyle/>
           <a:p>
             <a:endParaRPr/>
           </a:p>
@@ -3236,11 +3518,14 @@
       </p:sp>
     </p:spTree>
   </p:cSld>
+  <p:clrMapOvr>
+    <a:masterClrMapping/>
+  </p:clrMapOvr>
 </p:sldLayout>
 </file>
 
 <file path=ppt/slideLayouts/slideLayout8.xml><?xml version="1.0" encoding="utf-8"?>
-<p:sldLayout xmlns:a="http://schemas.openxmlformats.org/drawingml/2006/main" xmlns:p="http://schemas.openxmlformats.org/presentationml/2006/main" xmlns:r="http://schemas.openxmlformats.org/officeDocument/2006/relationships" type="objAndTwoObj" preserve="1">
+<p:sldLayout xmlns:a="http://schemas.openxmlformats.org/drawingml/2006/main" xmlns:r="http://schemas.openxmlformats.org/officeDocument/2006/relationships" xmlns:p="http://schemas.openxmlformats.org/presentationml/2006/main" type="objAndTwoObj" preserve="1">
   <p:cSld name="Title Content and 2 Content">
     <p:spTree>
       <p:nvGrpSpPr>
@@ -3276,7 +3561,8 @@
           </a:prstGeom>
         </p:spPr>
         <p:txBody>
-          <a:bodyPr lIns="0" rIns="0" tIns="0" bIns="0" anchor="ctr"/>
+          <a:bodyPr lIns="0" tIns="0" rIns="0" bIns="0" anchor="ctr"/>
+          <a:lstStyle/>
           <a:p>
             <a:pPr algn="ctr"/>
             <a:endParaRPr/>
@@ -3303,7 +3589,8 @@
           </a:prstGeom>
         </p:spPr>
         <p:txBody>
-          <a:bodyPr lIns="0" rIns="0" tIns="0" bIns="0"/>
+          <a:bodyPr lIns="0" tIns="0" rIns="0" bIns="0"/>
+          <a:lstStyle/>
           <a:p>
             <a:endParaRPr/>
           </a:p>
@@ -3329,7 +3616,8 @@
           </a:prstGeom>
         </p:spPr>
         <p:txBody>
-          <a:bodyPr lIns="0" rIns="0" tIns="0" bIns="0"/>
+          <a:bodyPr lIns="0" tIns="0" rIns="0" bIns="0"/>
+          <a:lstStyle/>
           <a:p>
             <a:endParaRPr/>
           </a:p>
@@ -3355,7 +3643,8 @@
           </a:prstGeom>
         </p:spPr>
         <p:txBody>
-          <a:bodyPr lIns="0" rIns="0" tIns="0" bIns="0"/>
+          <a:bodyPr lIns="0" tIns="0" rIns="0" bIns="0"/>
+          <a:lstStyle/>
           <a:p>
             <a:endParaRPr/>
           </a:p>
@@ -3363,11 +3652,14 @@
       </p:sp>
     </p:spTree>
   </p:cSld>
+  <p:clrMapOvr>
+    <a:masterClrMapping/>
+  </p:clrMapOvr>
 </p:sldLayout>
 </file>
 
 <file path=ppt/slideLayouts/slideLayout9.xml><?xml version="1.0" encoding="utf-8"?>
-<p:sldLayout xmlns:a="http://schemas.openxmlformats.org/drawingml/2006/main" xmlns:p="http://schemas.openxmlformats.org/presentationml/2006/main" xmlns:r="http://schemas.openxmlformats.org/officeDocument/2006/relationships" type="twoObjOverTx" preserve="1">
+<p:sldLayout xmlns:a="http://schemas.openxmlformats.org/drawingml/2006/main" xmlns:r="http://schemas.openxmlformats.org/officeDocument/2006/relationships" xmlns:p="http://schemas.openxmlformats.org/presentationml/2006/main" type="twoObjOverTx" preserve="1">
   <p:cSld name="Title, 2 Content over Content">
     <p:spTree>
       <p:nvGrpSpPr>
@@ -3403,7 +3695,8 @@
           </a:prstGeom>
         </p:spPr>
         <p:txBody>
-          <a:bodyPr lIns="0" rIns="0" tIns="0" bIns="0" anchor="ctr"/>
+          <a:bodyPr lIns="0" tIns="0" rIns="0" bIns="0" anchor="ctr"/>
+          <a:lstStyle/>
           <a:p>
             <a:pPr algn="ctr"/>
             <a:endParaRPr/>
@@ -3430,7 +3723,8 @@
           </a:prstGeom>
         </p:spPr>
         <p:txBody>
-          <a:bodyPr lIns="0" rIns="0" tIns="0" bIns="0"/>
+          <a:bodyPr lIns="0" tIns="0" rIns="0" bIns="0"/>
+          <a:lstStyle/>
           <a:p>
             <a:endParaRPr/>
           </a:p>
@@ -3456,7 +3750,8 @@
           </a:prstGeom>
         </p:spPr>
         <p:txBody>
-          <a:bodyPr lIns="0" rIns="0" tIns="0" bIns="0"/>
+          <a:bodyPr lIns="0" tIns="0" rIns="0" bIns="0"/>
+          <a:lstStyle/>
           <a:p>
             <a:endParaRPr/>
           </a:p>
@@ -3482,7 +3777,8 @@
           </a:prstGeom>
         </p:spPr>
         <p:txBody>
-          <a:bodyPr lIns="0" rIns="0" tIns="0" bIns="0"/>
+          <a:bodyPr lIns="0" tIns="0" rIns="0" bIns="0"/>
+          <a:lstStyle/>
           <a:p>
             <a:endParaRPr/>
           </a:p>
@@ -3490,20 +3786,24 @@
       </p:sp>
     </p:spTree>
   </p:cSld>
+  <p:clrMapOvr>
+    <a:masterClrMapping/>
+  </p:clrMapOvr>
 </p:sldLayout>
 </file>
 
 <file path=ppt/slideMasters/slideMaster1.xml><?xml version="1.0" encoding="utf-8"?>
-<p:sldMaster xmlns:a="http://schemas.openxmlformats.org/drawingml/2006/main" xmlns:p="http://schemas.openxmlformats.org/presentationml/2006/main" xmlns:r="http://schemas.openxmlformats.org/officeDocument/2006/relationships">
+<p:sldMaster xmlns:a="http://schemas.openxmlformats.org/drawingml/2006/main" xmlns:r="http://schemas.openxmlformats.org/officeDocument/2006/relationships" xmlns:p="http://schemas.openxmlformats.org/presentationml/2006/main">
   <p:cSld>
     <p:bg>
       <p:bgPr>
         <a:blipFill>
-          <a:blip r:embed="rId2"/>
+          <a:blip r:embed="rId14"/>
           <a:stretch>
             <a:fillRect/>
           </a:stretch>
         </a:blipFill>
+        <a:effectLst/>
       </p:bgPr>
     </p:bg>
     <p:spTree>
@@ -3522,7 +3822,7 @@
       </p:grpSpPr>
       <p:sp>
         <p:nvSpPr>
-          <p:cNvPr id="0" name="CustomShape 1"/>
+          <p:cNvPr id="10" name="CustomShape 1"/>
           <p:cNvSpPr/>
           <p:nvPr/>
         </p:nvSpPr>
@@ -3552,12 +3852,12 @@
       </p:sp>
       <p:pic>
         <p:nvPicPr>
-          <p:cNvPr id="1" name="Picture 6" descr=""/>
+          <p:cNvPr id="11" name="Picture 6"/>
           <p:cNvPicPr/>
           <p:nvPr/>
         </p:nvPicPr>
         <p:blipFill>
-          <a:blip r:embed="rId3"/>
+          <a:blip r:embed="rId15"/>
           <a:stretch>
             <a:fillRect/>
           </a:stretch>
@@ -3596,6 +3896,7 @@
         </p:spPr>
         <p:txBody>
           <a:bodyPr anchor="ctr"/>
+          <a:lstStyle/>
           <a:p>
             <a:pPr>
               <a:lnSpc>
@@ -3605,7 +3906,7 @@
             <a:r>
               <a:rPr lang="es-EC" sz="1200">
                 <a:solidFill>
-                  <a:srgbClr val="ece9c6"/>
+                  <a:srgbClr val="ECE9C6"/>
                 </a:solidFill>
                 <a:latin typeface="Book Antiqua"/>
               </a:rPr>
@@ -3636,6 +3937,7 @@
         </p:spPr>
         <p:txBody>
           <a:bodyPr anchor="ctr"/>
+          <a:lstStyle/>
           <a:p>
             <a:endParaRPr/>
           </a:p>
@@ -3662,6 +3964,7 @@
         </p:spPr>
         <p:txBody>
           <a:bodyPr anchor="ctr"/>
+          <a:lstStyle/>
           <a:p>
             <a:pPr>
               <a:lnSpc>
@@ -3671,11 +3974,11 @@
             <a:fld id="{B25EBB5C-9A4D-4F3D-B241-2E06984CE930}" type="slidenum">
               <a:rPr lang="es-EC" sz="1200">
                 <a:solidFill>
-                  <a:srgbClr val="ece9c6"/>
+                  <a:srgbClr val="ECE9C6"/>
                 </a:solidFill>
                 <a:latin typeface="Book Antiqua"/>
               </a:rPr>
-              <a:t>&lt;número&gt;</a:t>
+              <a:t>‹Nº›</a:t>
             </a:fld>
             <a:endParaRPr/>
           </a:p>
@@ -3701,7 +4004,8 @@
           </a:ln>
         </p:spPr>
         <p:txBody>
-          <a:bodyPr wrap="none" lIns="90000" rIns="90000" tIns="45000" bIns="45000"/>
+          <a:bodyPr wrap="none" lIns="90000" tIns="45000" rIns="90000" bIns="45000"/>
+          <a:lstStyle/>
           <a:p>
             <a:pPr>
               <a:lnSpc>
@@ -3711,7 +4015,7 @@
             <a:r>
               <a:rPr lang="es-EC" sz="5400">
                 <a:solidFill>
-                  <a:srgbClr val="e1dca5"/>
+                  <a:srgbClr val="E1DCA5"/>
                 </a:solidFill>
                 <a:latin typeface="Wingdings"/>
               </a:rPr>
@@ -3737,7 +4041,7 @@
           </a:prstGeom>
           <a:ln w="12600">
             <a:solidFill>
-              <a:srgbClr val="e1dca5"/>
+              <a:srgbClr val="E1DCA5"/>
             </a:solidFill>
             <a:round/>
           </a:ln>
@@ -3759,7 +4063,7 @@
           </a:prstGeom>
           <a:ln w="12600">
             <a:solidFill>
-              <a:srgbClr val="e1dca5"/>
+              <a:srgbClr val="E1DCA5"/>
             </a:solidFill>
             <a:round/>
           </a:ln>
@@ -3786,6 +4090,7 @@
         </p:spPr>
         <p:txBody>
           <a:bodyPr anchor="b"/>
+          <a:lstStyle/>
           <a:p>
             <a:pPr>
               <a:lnSpc>
@@ -3795,7 +4100,7 @@
             <a:r>
               <a:rPr lang="es-ES" sz="5400">
                 <a:solidFill>
-                  <a:srgbClr val="ffffff"/>
+                  <a:srgbClr val="FFFFFF"/>
                 </a:solidFill>
                 <a:latin typeface="Book Antiqua"/>
               </a:rPr>
@@ -3825,7 +4130,8 @@
           </a:prstGeom>
         </p:spPr>
         <p:txBody>
-          <a:bodyPr lIns="0" rIns="0" tIns="0" bIns="0"/>
+          <a:bodyPr lIns="0" tIns="0" rIns="0" bIns="0"/>
+          <a:lstStyle/>
           <a:p>
             <a:pPr>
               <a:buSzPct val="45000"/>
@@ -3928,33 +4234,39 @@
       </p:sp>
     </p:spTree>
   </p:cSld>
-  <p:clrMap bg1="lt1" bg2="lt2" tx1="dk1" tx2="dk2" accent1="accent1" accent2="accent2" accent3="accent3" accent4="accent4" accent5="accent5" accent6="accent6" hlink="hlink" folHlink="folHlink"/>
+  <p:clrMap bg1="lt1" tx1="dk1" bg2="lt2" tx2="dk2" accent1="accent1" accent2="accent2" accent3="accent3" accent4="accent4" accent5="accent5" accent6="accent6" hlink="hlink" folHlink="folHlink"/>
   <p:sldLayoutIdLst>
-    <p:sldLayoutId id="2147483649" r:id="rId4"/>
-    <p:sldLayoutId id="2147483650" r:id="rId5"/>
-    <p:sldLayoutId id="2147483651" r:id="rId6"/>
-    <p:sldLayoutId id="2147483652" r:id="rId7"/>
-    <p:sldLayoutId id="2147483653" r:id="rId8"/>
-    <p:sldLayoutId id="2147483654" r:id="rId9"/>
-    <p:sldLayoutId id="2147483655" r:id="rId10"/>
-    <p:sldLayoutId id="2147483656" r:id="rId11"/>
-    <p:sldLayoutId id="2147483657" r:id="rId12"/>
-    <p:sldLayoutId id="2147483658" r:id="rId13"/>
-    <p:sldLayoutId id="2147483659" r:id="rId14"/>
-    <p:sldLayoutId id="2147483660" r:id="rId15"/>
+    <p:sldLayoutId id="2147483649" r:id="rId1"/>
+    <p:sldLayoutId id="2147483650" r:id="rId2"/>
+    <p:sldLayoutId id="2147483651" r:id="rId3"/>
+    <p:sldLayoutId id="2147483652" r:id="rId4"/>
+    <p:sldLayoutId id="2147483653" r:id="rId5"/>
+    <p:sldLayoutId id="2147483654" r:id="rId6"/>
+    <p:sldLayoutId id="2147483655" r:id="rId7"/>
+    <p:sldLayoutId id="2147483656" r:id="rId8"/>
+    <p:sldLayoutId id="2147483657" r:id="rId9"/>
+    <p:sldLayoutId id="2147483658" r:id="rId10"/>
+    <p:sldLayoutId id="2147483659" r:id="rId11"/>
+    <p:sldLayoutId id="2147483660" r:id="rId12"/>
   </p:sldLayoutIdLst>
+  <p:txStyles>
+    <p:titleStyle/>
+    <p:bodyStyle/>
+    <p:otherStyle/>
+  </p:txStyles>
 </p:sldMaster>
 </file>
 
 <file path=ppt/slideMasters/slideMaster2.xml><?xml version="1.0" encoding="utf-8"?>
-<p:sldMaster xmlns:a="http://schemas.openxmlformats.org/drawingml/2006/main" xmlns:p="http://schemas.openxmlformats.org/presentationml/2006/main" xmlns:r="http://schemas.openxmlformats.org/officeDocument/2006/relationships">
+<p:sldMaster xmlns:a="http://schemas.openxmlformats.org/drawingml/2006/main" xmlns:r="http://schemas.openxmlformats.org/officeDocument/2006/relationships" xmlns:p="http://schemas.openxmlformats.org/presentationml/2006/main">
   <p:cSld>
     <p:bg>
       <p:bgPr>
         <a:blipFill>
-          <a:blip r:embed="rId2"/>
+          <a:blip r:embed="rId14"/>
           <a:tile/>
         </a:blipFill>
+        <a:effectLst/>
       </p:bgPr>
     </p:bg>
     <p:spTree>
@@ -3988,10 +4300,10 @@
           <a:gradFill>
             <a:gsLst>
               <a:gs pos="0">
-                <a:srgbClr val="ffffff"/>
+                <a:srgbClr val="FFFFFF"/>
               </a:gs>
               <a:gs pos="100000">
-                <a:srgbClr val="d1ca75"/>
+                <a:srgbClr val="D1CA75"/>
               </a:gs>
             </a:gsLst>
             <a:path path="rect"/>
@@ -4022,6 +4334,7 @@
         </p:spPr>
         <p:txBody>
           <a:bodyPr/>
+          <a:lstStyle/>
           <a:p>
             <a:pPr>
               <a:buSzPct val="45000"/>
@@ -4242,6 +4555,7 @@
         </p:spPr>
         <p:txBody>
           <a:bodyPr anchor="ctr"/>
+          <a:lstStyle/>
           <a:p>
             <a:pPr>
               <a:lnSpc>
@@ -4251,7 +4565,7 @@
             <a:r>
               <a:rPr lang="es-EC" sz="1200">
                 <a:solidFill>
-                  <a:srgbClr val="895d1d"/>
+                  <a:srgbClr val="895D1D"/>
                 </a:solidFill>
                 <a:latin typeface="Book Antiqua"/>
               </a:rPr>
@@ -4282,6 +4596,7 @@
         </p:spPr>
         <p:txBody>
           <a:bodyPr anchor="ctr"/>
+          <a:lstStyle/>
           <a:p>
             <a:endParaRPr/>
           </a:p>
@@ -4308,6 +4623,7 @@
         </p:spPr>
         <p:txBody>
           <a:bodyPr anchor="ctr"/>
+          <a:lstStyle/>
           <a:p>
             <a:pPr algn="r">
               <a:lnSpc>
@@ -4317,11 +4633,11 @@
             <a:fld id="{C42ED61E-EA8A-455B-9874-5B15300A18D3}" type="slidenum">
               <a:rPr lang="es-EC" sz="1200">
                 <a:solidFill>
-                  <a:srgbClr val="895d1d"/>
+                  <a:srgbClr val="895D1D"/>
                 </a:solidFill>
                 <a:latin typeface="Book Antiqua"/>
               </a:rPr>
-              <a:t>&lt;número&gt;</a:t>
+              <a:t>‹Nº›</a:t>
             </a:fld>
             <a:endParaRPr/>
           </a:p>
@@ -4348,6 +4664,7 @@
         </p:spPr>
         <p:txBody>
           <a:bodyPr anchor="ctr"/>
+          <a:lstStyle/>
           <a:p>
             <a:pPr algn="ctr">
               <a:lnSpc>
@@ -4357,7 +4674,7 @@
             <a:r>
               <a:rPr lang="es-ES" sz="5400">
                 <a:solidFill>
-                  <a:srgbClr val="895d1d"/>
+                  <a:srgbClr val="895D1D"/>
                 </a:solidFill>
                 <a:latin typeface="Book Antiqua"/>
               </a:rPr>
@@ -4387,7 +4704,8 @@
           </a:ln>
         </p:spPr>
         <p:txBody>
-          <a:bodyPr wrap="none" lIns="90000" rIns="90000" tIns="45000" bIns="45000"/>
+          <a:bodyPr wrap="none" lIns="90000" tIns="45000" rIns="90000" bIns="45000"/>
+          <a:lstStyle/>
           <a:p>
             <a:pPr>
               <a:lnSpc>
@@ -4397,7 +4715,7 @@
             <a:r>
               <a:rPr lang="es-EC" sz="5400">
                 <a:solidFill>
-                  <a:srgbClr val="dba455"/>
+                  <a:srgbClr val="DBA455"/>
                 </a:solidFill>
                 <a:latin typeface="Wingdings"/>
               </a:rPr>
@@ -4423,7 +4741,7 @@
           </a:prstGeom>
           <a:ln w="12600">
             <a:solidFill>
-              <a:srgbClr val="dba455"/>
+              <a:srgbClr val="DBA455"/>
             </a:solidFill>
             <a:round/>
           </a:ln>
@@ -4445,7 +4763,7 @@
           </a:prstGeom>
           <a:ln w="12600">
             <a:solidFill>
-              <a:srgbClr val="dba455"/>
+              <a:srgbClr val="DBA455"/>
             </a:solidFill>
             <a:round/>
           </a:ln>
@@ -4453,27 +4771,37 @@
       </p:sp>
     </p:spTree>
   </p:cSld>
-  <p:clrMap bg1="lt1" bg2="lt2" tx1="dk1" tx2="dk2" accent1="accent1" accent2="accent2" accent3="accent3" accent4="accent4" accent5="accent5" accent6="accent6" hlink="hlink" folHlink="folHlink"/>
+  <p:clrMap bg1="lt1" tx1="dk1" bg2="lt2" tx2="dk2" accent1="accent1" accent2="accent2" accent3="accent3" accent4="accent4" accent5="accent5" accent6="accent6" hlink="hlink" folHlink="folHlink"/>
   <p:sldLayoutIdLst>
-    <p:sldLayoutId id="2147483662" r:id="rId3"/>
-    <p:sldLayoutId id="2147483663" r:id="rId4"/>
-    <p:sldLayoutId id="2147483664" r:id="rId5"/>
-    <p:sldLayoutId id="2147483665" r:id="rId6"/>
-    <p:sldLayoutId id="2147483666" r:id="rId7"/>
-    <p:sldLayoutId id="2147483667" r:id="rId8"/>
-    <p:sldLayoutId id="2147483668" r:id="rId9"/>
-    <p:sldLayoutId id="2147483669" r:id="rId10"/>
-    <p:sldLayoutId id="2147483670" r:id="rId11"/>
-    <p:sldLayoutId id="2147483671" r:id="rId12"/>
-    <p:sldLayoutId id="2147483672" r:id="rId13"/>
-    <p:sldLayoutId id="2147483673" r:id="rId14"/>
+    <p:sldLayoutId id="2147483662" r:id="rId1"/>
+    <p:sldLayoutId id="2147483663" r:id="rId2"/>
+    <p:sldLayoutId id="2147483664" r:id="rId3"/>
+    <p:sldLayoutId id="2147483665" r:id="rId4"/>
+    <p:sldLayoutId id="2147483666" r:id="rId5"/>
+    <p:sldLayoutId id="2147483667" r:id="rId6"/>
+    <p:sldLayoutId id="2147483668" r:id="rId7"/>
+    <p:sldLayoutId id="2147483669" r:id="rId8"/>
+    <p:sldLayoutId id="2147483670" r:id="rId9"/>
+    <p:sldLayoutId id="2147483671" r:id="rId10"/>
+    <p:sldLayoutId id="2147483672" r:id="rId11"/>
+    <p:sldLayoutId id="2147483673" r:id="rId12"/>
   </p:sldLayoutIdLst>
+  <p:txStyles>
+    <p:titleStyle/>
+    <p:bodyStyle/>
+    <p:otherStyle/>
+  </p:txStyles>
 </p:sldMaster>
 </file>
 
 <file path=ppt/slideMasters/slideMaster3.xml><?xml version="1.0" encoding="utf-8"?>
-<p:sldMaster xmlns:a="http://schemas.openxmlformats.org/drawingml/2006/main" xmlns:p="http://schemas.openxmlformats.org/presentationml/2006/main" xmlns:r="http://schemas.openxmlformats.org/officeDocument/2006/relationships">
+<p:sldMaster xmlns:a="http://schemas.openxmlformats.org/drawingml/2006/main" xmlns:r="http://schemas.openxmlformats.org/officeDocument/2006/relationships" xmlns:p="http://schemas.openxmlformats.org/presentationml/2006/main">
   <p:cSld>
+    <p:bg>
+      <p:bgRef idx="1001">
+        <a:schemeClr val="bg1"/>
+      </p:bgRef>
+    </p:bg>
     <p:spTree>
       <p:nvGrpSpPr>
         <p:cNvPr id="1" name=""/>
@@ -4490,12 +4818,12 @@
       </p:grpSpPr>
       <p:pic>
         <p:nvPicPr>
-          <p:cNvPr id="87" name="" descr=""/>
+          <p:cNvPr id="87" name="86 Imagen"/>
           <p:cNvPicPr/>
           <p:nvPr/>
         </p:nvPicPr>
         <p:blipFill>
-          <a:blip r:embed="rId2"/>
+          <a:blip r:embed="rId14"/>
           <a:stretch>
             <a:fillRect/>
           </a:stretch>
@@ -4533,7 +4861,8 @@
           </a:prstGeom>
         </p:spPr>
         <p:txBody>
-          <a:bodyPr lIns="0" rIns="0" tIns="0" bIns="0" anchor="ctr"/>
+          <a:bodyPr lIns="0" tIns="0" rIns="0" bIns="0" anchor="ctr"/>
+          <a:lstStyle/>
           <a:p>
             <a:pPr algn="ctr"/>
             <a:r>
@@ -4566,7 +4895,8 @@
           </a:prstGeom>
         </p:spPr>
         <p:txBody>
-          <a:bodyPr lIns="0" rIns="0" tIns="0" bIns="0"/>
+          <a:bodyPr lIns="0" tIns="0" rIns="0" bIns="0"/>
+          <a:lstStyle/>
           <a:p>
             <a:pPr>
               <a:buSzPct val="45000"/>
@@ -4687,7 +5017,8 @@
           </a:prstGeom>
         </p:spPr>
         <p:txBody>
-          <a:bodyPr lIns="0" rIns="0" tIns="0" bIns="0"/>
+          <a:bodyPr lIns="0" tIns="0" rIns="0" bIns="0"/>
+          <a:lstStyle/>
           <a:p>
             <a:r>
               <a:rPr lang="es-EC" sz="1400">
@@ -4719,7 +5050,8 @@
           </a:prstGeom>
         </p:spPr>
         <p:txBody>
-          <a:bodyPr lIns="0" rIns="0" tIns="0" bIns="0"/>
+          <a:bodyPr lIns="0" tIns="0" rIns="0" bIns="0"/>
+          <a:lstStyle/>
           <a:p>
             <a:pPr algn="ctr"/>
             <a:r>
@@ -4752,14 +5084,15 @@
           </a:prstGeom>
         </p:spPr>
         <p:txBody>
-          <a:bodyPr lIns="0" rIns="0" tIns="0" bIns="0"/>
+          <a:bodyPr lIns="0" tIns="0" rIns="0" bIns="0"/>
+          <a:lstStyle/>
           <a:p>
             <a:pPr algn="r"/>
             <a:fld id="{8F890FF0-87D8-45B5-A453-350C530C69BE}" type="slidenum">
               <a:rPr lang="es-EC" sz="1400">
                 <a:latin typeface="Times New Roman"/>
               </a:rPr>
-              <a:t>&lt;número&gt;</a:t>
+              <a:t>‹Nº›</a:t>
             </a:fld>
             <a:endParaRPr/>
           </a:p>
@@ -4767,26 +5100,31 @@
       </p:sp>
     </p:spTree>
   </p:cSld>
-  <p:clrMap bg1="lt1" bg2="lt2" tx1="dk1" tx2="dk2" accent1="accent1" accent2="accent2" accent3="accent3" accent4="accent4" accent5="accent5" accent6="accent6" hlink="hlink" folHlink="folHlink"/>
+  <p:clrMap bg1="lt1" tx1="dk1" bg2="lt2" tx2="dk2" accent1="accent1" accent2="accent2" accent3="accent3" accent4="accent4" accent5="accent5" accent6="accent6" hlink="hlink" folHlink="folHlink"/>
   <p:sldLayoutIdLst>
-    <p:sldLayoutId id="2147483675" r:id="rId3"/>
-    <p:sldLayoutId id="2147483676" r:id="rId4"/>
-    <p:sldLayoutId id="2147483677" r:id="rId5"/>
-    <p:sldLayoutId id="2147483678" r:id="rId6"/>
-    <p:sldLayoutId id="2147483679" r:id="rId7"/>
-    <p:sldLayoutId id="2147483680" r:id="rId8"/>
-    <p:sldLayoutId id="2147483681" r:id="rId9"/>
-    <p:sldLayoutId id="2147483682" r:id="rId10"/>
-    <p:sldLayoutId id="2147483683" r:id="rId11"/>
-    <p:sldLayoutId id="2147483684" r:id="rId12"/>
-    <p:sldLayoutId id="2147483685" r:id="rId13"/>
-    <p:sldLayoutId id="2147483686" r:id="rId14"/>
+    <p:sldLayoutId id="2147483675" r:id="rId1"/>
+    <p:sldLayoutId id="2147483676" r:id="rId2"/>
+    <p:sldLayoutId id="2147483677" r:id="rId3"/>
+    <p:sldLayoutId id="2147483678" r:id="rId4"/>
+    <p:sldLayoutId id="2147483679" r:id="rId5"/>
+    <p:sldLayoutId id="2147483680" r:id="rId6"/>
+    <p:sldLayoutId id="2147483681" r:id="rId7"/>
+    <p:sldLayoutId id="2147483682" r:id="rId8"/>
+    <p:sldLayoutId id="2147483683" r:id="rId9"/>
+    <p:sldLayoutId id="2147483684" r:id="rId10"/>
+    <p:sldLayoutId id="2147483685" r:id="rId11"/>
+    <p:sldLayoutId id="2147483686" r:id="rId12"/>
   </p:sldLayoutIdLst>
+  <p:txStyles>
+    <p:titleStyle/>
+    <p:bodyStyle/>
+    <p:otherStyle/>
+  </p:txStyles>
 </p:sldMaster>
 </file>
 
 <file path=ppt/slides/slide1.xml><?xml version="1.0" encoding="utf-8"?>
-<p:sld xmlns:a="http://schemas.openxmlformats.org/drawingml/2006/main" xmlns:p="http://schemas.openxmlformats.org/presentationml/2006/main" xmlns:r="http://schemas.openxmlformats.org/officeDocument/2006/relationships">
+<p:sld xmlns:a="http://schemas.openxmlformats.org/drawingml/2006/main" xmlns:r="http://schemas.openxmlformats.org/officeDocument/2006/relationships" xmlns:p="http://schemas.openxmlformats.org/presentationml/2006/main">
   <p:cSld>
     <p:spTree>
       <p:nvGrpSpPr>
@@ -4819,6 +5157,7 @@
         </p:spPr>
         <p:txBody>
           <a:bodyPr anchor="b"/>
+          <a:lstStyle/>
           <a:p>
             <a:pPr>
               <a:lnSpc>
@@ -4828,7 +5167,7 @@
             <a:r>
               <a:rPr lang="es-EC" sz="5400">
                 <a:solidFill>
-                  <a:srgbClr val="ffffff"/>
+                  <a:srgbClr val="FFFFFF"/>
                 </a:solidFill>
                 <a:latin typeface="Book Antiqua"/>
               </a:rPr>
@@ -4840,6 +5179,9 @@
       </p:sp>
     </p:spTree>
   </p:cSld>
+  <p:clrMapOvr>
+    <a:masterClrMapping/>
+  </p:clrMapOvr>
   <p:timing>
     <p:tnLst>
       <p:par>
@@ -4848,14 +5190,14 @@
             <p:seq>
               <p:cTn id="2" nodeType="mainSeq"/>
               <p:prevCondLst>
-                <p:cond delay="0" evt="onPrev">
+                <p:cond evt="onPrev" delay="0">
                   <p:tgtEl>
                     <p:sldTgt/>
                   </p:tgtEl>
                 </p:cond>
               </p:prevCondLst>
               <p:nextCondLst>
-                <p:cond delay="0" evt="onNext">
+                <p:cond evt="onNext" delay="0">
                   <p:tgtEl>
                     <p:sldTgt/>
                   </p:tgtEl>
@@ -4871,7 +5213,7 @@
 </file>
 
 <file path=ppt/slides/slide2.xml><?xml version="1.0" encoding="utf-8"?>
-<p:sld xmlns:a="http://schemas.openxmlformats.org/drawingml/2006/main" xmlns:p="http://schemas.openxmlformats.org/presentationml/2006/main" xmlns:r="http://schemas.openxmlformats.org/officeDocument/2006/relationships">
+<p:sld xmlns:a="http://schemas.openxmlformats.org/drawingml/2006/main" xmlns:r="http://schemas.openxmlformats.org/officeDocument/2006/relationships" xmlns:p="http://schemas.openxmlformats.org/presentationml/2006/main">
   <p:cSld>
     <p:spTree>
       <p:nvGrpSpPr>
@@ -4903,10 +5245,11 @@
           </a:prstGeom>
         </p:spPr>
         <p:txBody>
-          <a:bodyPr lIns="90000" rIns="90000" tIns="45000" bIns="45000"/>
-          <a:p>
-            <a:r>
-              <a:rPr b="1" lang="es-EC">
+          <a:bodyPr lIns="90000" tIns="45000" rIns="90000" bIns="45000"/>
+          <a:lstStyle/>
+          <a:p>
+            <a:r>
+              <a:rPr lang="es-EC" b="1">
                 <a:latin typeface="Arial"/>
               </a:rPr>
               <a:t>AHORA:</a:t>
@@ -4924,7 +5267,7 @@
           </a:p>
           <a:p>
             <a:r>
-              <a:rPr b="1" lang="es-EC">
+              <a:rPr lang="es-EC" b="1">
                 <a:latin typeface="Arial"/>
               </a:rPr>
               <a:t>AÑO:</a:t>
@@ -4942,7 +5285,7 @@
           </a:p>
           <a:p>
             <a:r>
-              <a:rPr b="1" lang="es-EC">
+              <a:rPr lang="es-EC" b="1">
                 <a:latin typeface="Arial"/>
               </a:rPr>
               <a:t>DIA:</a:t>
@@ -4960,7 +5303,7 @@
           </a:p>
           <a:p>
             <a:r>
-              <a:rPr b="1" lang="es-EC">
+              <a:rPr lang="es-EC" b="1">
                 <a:latin typeface="Arial"/>
               </a:rPr>
               <a:t>DIA.LAB:</a:t>
@@ -4978,7 +5321,7 @@
           </a:p>
           <a:p>
             <a:r>
-              <a:rPr b="1" lang="es-EC">
+              <a:rPr lang="es-EC" b="1">
                 <a:latin typeface="Arial"/>
               </a:rPr>
               <a:t>DIAS.LAB:</a:t>
@@ -4996,7 +5339,7 @@
           </a:p>
           <a:p>
             <a:r>
-              <a:rPr b="1" lang="es-EC">
+              <a:rPr lang="es-EC" b="1">
                 <a:latin typeface="Arial"/>
               </a:rPr>
               <a:t>DIAS360:</a:t>
@@ -5014,7 +5357,7 @@
           </a:p>
           <a:p>
             <a:r>
-              <a:rPr b="1" lang="es-EC">
+              <a:rPr lang="es-EC" b="1">
                 <a:latin typeface="Arial"/>
               </a:rPr>
               <a:t>DIASEM:</a:t>
@@ -5032,7 +5375,7 @@
           </a:p>
           <a:p>
             <a:r>
-              <a:rPr b="1" lang="es-EC">
+              <a:rPr lang="es-EC" b="1">
                 <a:latin typeface="Arial"/>
               </a:rPr>
               <a:t>FECHA:</a:t>
@@ -5050,7 +5393,7 @@
           </a:p>
           <a:p>
             <a:r>
-              <a:rPr b="1" lang="es-EC">
+              <a:rPr lang="es-EC" b="1">
                 <a:latin typeface="Arial"/>
               </a:rPr>
               <a:t>FECHA.MES:</a:t>
@@ -5070,22 +5413,25 @@
       </p:sp>
     </p:spTree>
   </p:cSld>
+  <p:clrMapOvr>
+    <a:masterClrMapping/>
+  </p:clrMapOvr>
   <p:timing>
     <p:tnLst>
       <p:par>
-        <p:cTn id="3" dur="indefinite" restart="never" nodeType="tmRoot">
+        <p:cTn id="1" dur="indefinite" restart="never" nodeType="tmRoot">
           <p:childTnLst>
             <p:seq>
-              <p:cTn id="4" nodeType="mainSeq"/>
+              <p:cTn id="2" nodeType="mainSeq"/>
               <p:prevCondLst>
-                <p:cond delay="0" evt="onPrev">
+                <p:cond evt="onPrev" delay="0">
                   <p:tgtEl>
                     <p:sldTgt/>
                   </p:tgtEl>
                 </p:cond>
               </p:prevCondLst>
               <p:nextCondLst>
-                <p:cond delay="0" evt="onNext">
+                <p:cond evt="onNext" delay="0">
                   <p:tgtEl>
                     <p:sldTgt/>
                   </p:tgtEl>
@@ -5101,7 +5447,7 @@
 </file>
 
 <file path=ppt/slides/slide3.xml><?xml version="1.0" encoding="utf-8"?>
-<p:sld xmlns:a="http://schemas.openxmlformats.org/drawingml/2006/main" xmlns:p="http://schemas.openxmlformats.org/presentationml/2006/main" xmlns:r="http://schemas.openxmlformats.org/officeDocument/2006/relationships">
+<p:sld xmlns:a="http://schemas.openxmlformats.org/drawingml/2006/main" xmlns:r="http://schemas.openxmlformats.org/officeDocument/2006/relationships" xmlns:p="http://schemas.openxmlformats.org/presentationml/2006/main">
   <p:cSld>
     <p:spTree>
       <p:nvGrpSpPr>
@@ -5133,10 +5479,11 @@
           </a:prstGeom>
         </p:spPr>
         <p:txBody>
-          <a:bodyPr lIns="90000" rIns="90000" tIns="45000" bIns="45000"/>
-          <a:p>
-            <a:r>
-              <a:rPr b="1" lang="es-EC">
+          <a:bodyPr lIns="90000" tIns="45000" rIns="90000" bIns="45000"/>
+          <a:lstStyle/>
+          <a:p>
+            <a:r>
+              <a:rPr lang="es-EC" b="1">
                 <a:latin typeface="Arial"/>
               </a:rPr>
               <a:t>FECHANUMERO:</a:t>
@@ -5154,7 +5501,7 @@
           </a:p>
           <a:p>
             <a:r>
-              <a:rPr b="1" lang="es-EC">
+              <a:rPr lang="es-EC" b="1">
                 <a:latin typeface="Arial"/>
               </a:rPr>
               <a:t>FIN.MES:</a:t>
@@ -5172,7 +5519,7 @@
           </a:p>
           <a:p>
             <a:r>
-              <a:rPr b="1" lang="es-EC">
+              <a:rPr lang="es-EC" b="1">
                 <a:latin typeface="Arial"/>
               </a:rPr>
               <a:t>FRAC.AÑO:</a:t>
@@ -5190,7 +5537,7 @@
           </a:p>
           <a:p>
             <a:r>
-              <a:rPr b="1" lang="es-EC">
+              <a:rPr lang="es-EC" b="1">
                 <a:latin typeface="Arial"/>
               </a:rPr>
               <a:t>HORA:</a:t>
@@ -5217,7 +5564,7 @@
           </a:p>
           <a:p>
             <a:r>
-              <a:rPr b="1" lang="es-EC">
+              <a:rPr lang="es-EC" b="1">
                 <a:latin typeface="Arial"/>
               </a:rPr>
               <a:t>HORANUMERO:</a:t>
@@ -5235,7 +5582,7 @@
           </a:p>
           <a:p>
             <a:r>
-              <a:rPr b="1" lang="es-EC">
+              <a:rPr lang="es-EC" b="1">
                 <a:latin typeface="Arial"/>
               </a:rPr>
               <a:t>HOY:</a:t>
@@ -5253,7 +5600,7 @@
           </a:p>
           <a:p>
             <a:r>
-              <a:rPr b="1" lang="es-EC">
+              <a:rPr lang="es-EC" b="1">
                 <a:latin typeface="Arial"/>
               </a:rPr>
               <a:t>MES:</a:t>
@@ -5271,7 +5618,7 @@
           </a:p>
           <a:p>
             <a:r>
-              <a:rPr b="1" lang="es-EC">
+              <a:rPr lang="es-EC" b="1">
                 <a:latin typeface="Arial"/>
               </a:rPr>
               <a:t>MINUTO:</a:t>
@@ -5297,22 +5644,25 @@
       </p:sp>
     </p:spTree>
   </p:cSld>
+  <p:clrMapOvr>
+    <a:masterClrMapping/>
+  </p:clrMapOvr>
   <p:timing>
     <p:tnLst>
       <p:par>
-        <p:cTn id="5" dur="indefinite" restart="never" nodeType="tmRoot">
+        <p:cTn id="1" dur="indefinite" restart="never" nodeType="tmRoot">
           <p:childTnLst>
             <p:seq>
-              <p:cTn id="6" nodeType="mainSeq"/>
+              <p:cTn id="2" nodeType="mainSeq"/>
               <p:prevCondLst>
-                <p:cond delay="0" evt="onPrev">
+                <p:cond evt="onPrev" delay="0">
                   <p:tgtEl>
                     <p:sldTgt/>
                   </p:tgtEl>
                 </p:cond>
               </p:prevCondLst>
               <p:nextCondLst>
-                <p:cond delay="0" evt="onNext">
+                <p:cond evt="onNext" delay="0">
                   <p:tgtEl>
                     <p:sldTgt/>
                   </p:tgtEl>
@@ -5328,7 +5678,7 @@
 </file>
 
 <file path=ppt/slides/slide4.xml><?xml version="1.0" encoding="utf-8"?>
-<p:sld xmlns:a="http://schemas.openxmlformats.org/drawingml/2006/main" xmlns:p="http://schemas.openxmlformats.org/presentationml/2006/main" xmlns:r="http://schemas.openxmlformats.org/officeDocument/2006/relationships">
+<p:sld xmlns:a="http://schemas.openxmlformats.org/drawingml/2006/main" xmlns:r="http://schemas.openxmlformats.org/officeDocument/2006/relationships" xmlns:p="http://schemas.openxmlformats.org/presentationml/2006/main">
   <p:cSld>
     <p:spTree>
       <p:nvGrpSpPr>
@@ -5360,10 +5710,11 @@
           </a:prstGeom>
         </p:spPr>
         <p:txBody>
-          <a:bodyPr lIns="90000" rIns="90000" tIns="45000" bIns="45000"/>
-          <a:p>
-            <a:r>
-              <a:rPr b="1" lang="es-EC">
+          <a:bodyPr lIns="90000" tIns="45000" rIns="90000" bIns="45000"/>
+          <a:lstStyle/>
+          <a:p>
+            <a:r>
+              <a:rPr lang="es-EC" b="1">
                 <a:latin typeface="Arial"/>
               </a:rPr>
               <a:t>NSHORA:</a:t>
@@ -5381,7 +5732,7 @@
           </a:p>
           <a:p>
             <a:r>
-              <a:rPr b="1" lang="es-EC">
+              <a:rPr lang="es-EC" b="1">
                 <a:latin typeface="Arial"/>
               </a:rPr>
               <a:t>NUM.DE.SEMANA:</a:t>
@@ -5399,7 +5750,7 @@
           </a:p>
           <a:p>
             <a:r>
-              <a:rPr b="1" lang="es-EC">
+              <a:rPr lang="es-EC" b="1">
                 <a:latin typeface="Arial"/>
               </a:rPr>
               <a:t>SEGUNDO:</a:t>
@@ -5416,22 +5767,25 @@
       </p:sp>
     </p:spTree>
   </p:cSld>
+  <p:clrMapOvr>
+    <a:masterClrMapping/>
+  </p:clrMapOvr>
   <p:timing>
     <p:tnLst>
       <p:par>
-        <p:cTn id="7" dur="indefinite" restart="never" nodeType="tmRoot">
+        <p:cTn id="1" dur="indefinite" restart="never" nodeType="tmRoot">
           <p:childTnLst>
             <p:seq>
-              <p:cTn id="8" nodeType="mainSeq"/>
+              <p:cTn id="2" nodeType="mainSeq"/>
               <p:prevCondLst>
-                <p:cond delay="0" evt="onPrev">
+                <p:cond evt="onPrev" delay="0">
                   <p:tgtEl>
                     <p:sldTgt/>
                   </p:tgtEl>
                 </p:cond>
               </p:prevCondLst>
               <p:nextCondLst>
-                <p:cond delay="0" evt="onNext">
+                <p:cond evt="onNext" delay="0">
                   <p:tgtEl>
                     <p:sldTgt/>
                   </p:tgtEl>
@@ -5447,7 +5801,7 @@
 </file>
 
 <file path=ppt/slides/slide5.xml><?xml version="1.0" encoding="utf-8"?>
-<p:sld xmlns:a="http://schemas.openxmlformats.org/drawingml/2006/main" xmlns:p="http://schemas.openxmlformats.org/presentationml/2006/main" xmlns:r="http://schemas.openxmlformats.org/officeDocument/2006/relationships">
+<p:sld xmlns:a="http://schemas.openxmlformats.org/drawingml/2006/main" xmlns:r="http://schemas.openxmlformats.org/officeDocument/2006/relationships" xmlns:p="http://schemas.openxmlformats.org/presentationml/2006/main">
   <p:cSld>
     <p:spTree>
       <p:nvGrpSpPr>
@@ -5479,7 +5833,8 @@
           </a:prstGeom>
         </p:spPr>
         <p:txBody>
-          <a:bodyPr lIns="90000" rIns="90000" tIns="45000" bIns="45000"/>
+          <a:bodyPr lIns="90000" tIns="45000" rIns="90000" bIns="45000"/>
+          <a:lstStyle/>
           <a:p>
             <a:r>
               <a:rPr lang="es-EC" sz="3600">
@@ -5493,22 +5848,25 @@
       </p:sp>
     </p:spTree>
   </p:cSld>
+  <p:clrMapOvr>
+    <a:masterClrMapping/>
+  </p:clrMapOvr>
   <p:timing>
     <p:tnLst>
       <p:par>
-        <p:cTn id="9" dur="indefinite" restart="never" nodeType="tmRoot">
+        <p:cTn id="1" dur="indefinite" restart="never" nodeType="tmRoot">
           <p:childTnLst>
             <p:seq>
-              <p:cTn id="10" nodeType="mainSeq"/>
+              <p:cTn id="2" nodeType="mainSeq"/>
               <p:prevCondLst>
-                <p:cond delay="0" evt="onPrev">
+                <p:cond evt="onPrev" delay="0">
                   <p:tgtEl>
                     <p:sldTgt/>
                   </p:tgtEl>
                 </p:cond>
               </p:prevCondLst>
               <p:nextCondLst>
-                <p:cond delay="0" evt="onNext">
+                <p:cond evt="onNext" delay="0">
                   <p:tgtEl>
                     <p:sldTgt/>
                   </p:tgtEl>
@@ -5524,7 +5882,7 @@
 </file>
 
 <file path=ppt/slides/slide6.xml><?xml version="1.0" encoding="utf-8"?>
-<p:sld xmlns:a="http://schemas.openxmlformats.org/drawingml/2006/main" xmlns:p="http://schemas.openxmlformats.org/presentationml/2006/main" xmlns:r="http://schemas.openxmlformats.org/officeDocument/2006/relationships">
+<p:sld xmlns:a="http://schemas.openxmlformats.org/drawingml/2006/main" xmlns:r="http://schemas.openxmlformats.org/officeDocument/2006/relationships" xmlns:p="http://schemas.openxmlformats.org/presentationml/2006/main">
   <p:cSld>
     <p:spTree>
       <p:nvGrpSpPr>
@@ -5556,30 +5914,31 @@
           </a:prstGeom>
         </p:spPr>
         <p:txBody>
-          <a:bodyPr lIns="90000" rIns="90000" tIns="45000" bIns="45000"/>
-          <a:p>
-            <a:r>
-              <a:rPr lang="es-EC">
+          <a:bodyPr lIns="90000" tIns="45000" rIns="90000" bIns="45000"/>
+          <a:lstStyle/>
+          <a:p>
+            <a:r>
+              <a:rPr lang="es-EC" dirty="0">
                 <a:latin typeface="Arial"/>
               </a:rPr>
               <a:t>1) Calcule la edad de Luis, donde su fecha de nacimiento es el 1987-11-12?</a:t>
             </a:r>
-            <a:endParaRPr/>
-          </a:p>
-          <a:p>
-            <a:endParaRPr/>
-          </a:p>
-          <a:p>
-            <a:r>
-              <a:rPr lang="es-EC">
+            <a:endParaRPr dirty="0"/>
+          </a:p>
+          <a:p>
+            <a:endParaRPr dirty="0"/>
+          </a:p>
+          <a:p>
+            <a:r>
+              <a:rPr lang="es-EC" dirty="0">
                 <a:latin typeface="Arial"/>
               </a:rPr>
               <a:t>2) Dado el siguiente reporte del reloj biométrico de Juan Pablo:</a:t>
             </a:r>
-            <a:endParaRPr/>
-          </a:p>
-          <a:p>
-            <a:endParaRPr/>
+            <a:endParaRPr dirty="0"/>
+          </a:p>
+          <a:p>
+            <a:endParaRPr dirty="0"/>
           </a:p>
           <a:p>
             <a:pPr>
@@ -5588,12 +5947,18 @@
               <a:buChar char=""/>
             </a:pPr>
             <a:r>
-              <a:rPr lang="es-EC">
+              <a:rPr lang="es-EC" dirty="0" smtClean="0">
                 <a:latin typeface="Arial"/>
               </a:rPr>
-              <a:t>5/7/2015 9:01:13 AM</a:t>
-            </a:r>
-            <a:endParaRPr/>
+              <a:t> 5/7/2015 </a:t>
+            </a:r>
+            <a:r>
+              <a:rPr lang="es-EC" dirty="0">
+                <a:latin typeface="Arial"/>
+              </a:rPr>
+              <a:t>9:01:13 AM</a:t>
+            </a:r>
+            <a:endParaRPr dirty="0"/>
           </a:p>
           <a:p>
             <a:pPr>
@@ -5602,12 +5967,18 @@
               <a:buChar char=""/>
             </a:pPr>
             <a:r>
-              <a:rPr lang="es-EC">
+              <a:rPr lang="es-EC" dirty="0" smtClean="0">
                 <a:latin typeface="Arial"/>
               </a:rPr>
-              <a:t>5/7/2015 12:43:18 PM</a:t>
-            </a:r>
-            <a:endParaRPr/>
+              <a:t> 5/7/2015 </a:t>
+            </a:r>
+            <a:r>
+              <a:rPr lang="es-EC" dirty="0">
+                <a:latin typeface="Arial"/>
+              </a:rPr>
+              <a:t>12:43:18 PM</a:t>
+            </a:r>
+            <a:endParaRPr dirty="0"/>
           </a:p>
           <a:p>
             <a:pPr>
@@ -5616,12 +5987,18 @@
               <a:buChar char=""/>
             </a:pPr>
             <a:r>
-              <a:rPr lang="es-EC">
+              <a:rPr lang="es-EC" dirty="0" smtClean="0">
                 <a:latin typeface="Arial"/>
               </a:rPr>
-              <a:t>5/7/2015 2:31:15 PM</a:t>
-            </a:r>
-            <a:endParaRPr/>
+              <a:t> 5/7/2015 </a:t>
+            </a:r>
+            <a:r>
+              <a:rPr lang="es-EC" dirty="0">
+                <a:latin typeface="Arial"/>
+              </a:rPr>
+              <a:t>2:31:15 PM</a:t>
+            </a:r>
+            <a:endParaRPr dirty="0"/>
           </a:p>
           <a:p>
             <a:pPr>
@@ -5630,87 +6007,114 @@
               <a:buChar char=""/>
             </a:pPr>
             <a:r>
-              <a:rPr lang="es-EC">
+              <a:rPr lang="es-EC" dirty="0" smtClean="0">
                 <a:latin typeface="Arial"/>
               </a:rPr>
-              <a:t>5/7/2015 7:00:33 PM</a:t>
-            </a:r>
-            <a:endParaRPr/>
-          </a:p>
-          <a:p>
-            <a:endParaRPr/>
-          </a:p>
-          <a:p>
-            <a:r>
-              <a:rPr lang="es-EC">
+              <a:t> 5/7/2015 </a:t>
+            </a:r>
+            <a:r>
+              <a:rPr lang="es-EC" dirty="0">
                 <a:latin typeface="Arial"/>
               </a:rPr>
+              <a:t>7:00:33 PM</a:t>
+            </a:r>
+            <a:endParaRPr dirty="0"/>
+          </a:p>
+          <a:p>
+            <a:endParaRPr dirty="0"/>
+          </a:p>
+          <a:p>
+            <a:r>
+              <a:rPr lang="es-EC" dirty="0">
+                <a:latin typeface="Arial"/>
+              </a:rPr>
               <a:t>Cuantas horas ha trabajado Juan Pablo el 7 de mayo del 2015?</a:t>
             </a:r>
-            <a:endParaRPr/>
-          </a:p>
-          <a:p>
-            <a:endParaRPr/>
-          </a:p>
-          <a:p>
-            <a:r>
-              <a:rPr lang="es-EC">
+            <a:endParaRPr dirty="0"/>
+          </a:p>
+          <a:p>
+            <a:endParaRPr dirty="0"/>
+          </a:p>
+          <a:p>
+            <a:r>
+              <a:rPr lang="es-EC" dirty="0">
                 <a:latin typeface="Arial"/>
               </a:rPr>
-              <a:t>3) Si Juan entro a trabajar el 1 de mayo del 2011, y salio del trabajo el 31 de diciembre del 2013, Cuanto dinero gano en la empresa, suponiendo que se le pago de manera constante $8 la hora?</a:t>
-            </a:r>
-            <a:endParaRPr/>
-          </a:p>
-          <a:p>
-            <a:endParaRPr/>
-          </a:p>
-          <a:p>
-            <a:r>
-              <a:rPr lang="es-EC">
+              <a:t>3) Si Juan entro a trabajar el 1 de mayo del 2011, y </a:t>
+            </a:r>
+            <a:r>
+              <a:rPr lang="es-EC" dirty="0" err="1">
                 <a:latin typeface="Arial"/>
               </a:rPr>
-              <a:t>4) Cual es la diferencia de años entre 2011-05-05 y 2001-04-04?</a:t>
-            </a:r>
-            <a:endParaRPr/>
-          </a:p>
-          <a:p>
-            <a:endParaRPr/>
-          </a:p>
-          <a:p>
-            <a:r>
-              <a:rPr lang="es-EC">
+              <a:t>salio</a:t>
+            </a:r>
+            <a:r>
+              <a:rPr lang="es-EC" dirty="0">
                 <a:latin typeface="Arial"/>
               </a:rPr>
+              <a:t> del trabajo el 31 de diciembre del 2013, Cuanto dinero gano en la empresa, suponiendo que se le pago de manera constante $8 la hora?</a:t>
+            </a:r>
+            <a:endParaRPr dirty="0"/>
+          </a:p>
+          <a:p>
+            <a:endParaRPr dirty="0"/>
+          </a:p>
+          <a:p>
+            <a:r>
+              <a:rPr lang="es-EC" dirty="0">
+                <a:latin typeface="Arial"/>
+              </a:rPr>
+              <a:t>4) Cual es la diferencia de años entre 2011-05-05 y </a:t>
+            </a:r>
+            <a:r>
+              <a:rPr lang="es-EC" dirty="0" smtClean="0">
+                <a:latin typeface="Arial"/>
+              </a:rPr>
+              <a:t>2001-04-04?</a:t>
+            </a:r>
+            <a:endParaRPr dirty="0"/>
+          </a:p>
+          <a:p>
+            <a:endParaRPr dirty="0"/>
+          </a:p>
+          <a:p>
+            <a:r>
+              <a:rPr lang="es-EC" dirty="0">
+                <a:latin typeface="Arial"/>
+              </a:rPr>
               <a:t>5) Si Enrique ha comprado un seguro médico el 2008-08-31, donde lo mantuvo hasta el 2013-12-21, Obtenga el rango de fechas de pago mensual del seguro médico?</a:t>
             </a:r>
-            <a:endParaRPr/>
-          </a:p>
-          <a:p>
-            <a:endParaRPr/>
-          </a:p>
-          <a:p>
-            <a:endParaRPr/>
+            <a:endParaRPr dirty="0"/>
+          </a:p>
+          <a:p>
+            <a:endParaRPr dirty="0"/>
+          </a:p>
+          <a:p>
+            <a:endParaRPr dirty="0"/>
           </a:p>
         </p:txBody>
       </p:sp>
     </p:spTree>
   </p:cSld>
+  <p:clrMapOvr>
+    <a:masterClrMapping/>
+  </p:clrMapOvr>
   <p:timing>
     <p:tnLst>
       <p:par>
-        <p:cTn id="11" dur="indefinite" restart="never" nodeType="tmRoot">
+        <p:cTn id="1" dur="indefinite" restart="never" nodeType="tmRoot">
           <p:childTnLst>
             <p:seq>
-              <p:cTn id="12" nodeType="mainSeq"/>
+              <p:cTn id="2" nodeType="mainSeq"/>
               <p:prevCondLst>
-                <p:cond delay="0" evt="onPrev">
+                <p:cond evt="onPrev" delay="0">
                   <p:tgtEl>
                     <p:sldTgt/>
                   </p:tgtEl>
                 </p:cond>
               </p:prevCondLst>
               <p:nextCondLst>
-                <p:cond delay="0" evt="onNext">
+                <p:cond evt="onNext" delay="0">
                   <p:tgtEl>
                     <p:sldTgt/>
                   </p:tgtEl>
@@ -5945,6 +6349,8 @@
       </a:bgFillStyleLst>
     </a:fmtScheme>
   </a:themeElements>
+  <a:objectDefaults/>
+  <a:extraClrSchemeLst/>
 </a:theme>
 </file>
 
@@ -6168,6 +6574,8 @@
       </a:bgFillStyleLst>
     </a:fmtScheme>
   </a:themeElements>
+  <a:objectDefaults/>
+  <a:extraClrSchemeLst/>
 </a:theme>
 </file>
 
@@ -6391,5 +6799,7 @@
       </a:bgFillStyleLst>
     </a:fmtScheme>
   </a:themeElements>
+  <a:objectDefaults/>
+  <a:extraClrSchemeLst/>
 </a:theme>
 </file>
</xml_diff>